<commit_message>
Added general examples, expanded game to work with multiple characters with UI extension.
</commit_message>
<xml_diff>
--- a/Lecture4.pptx
+++ b/Lecture4.pptx
@@ -181,7 +181,7 @@
   <pc:docChgLst>
     <pc:chgData name="Peter" userId="11f48ace-9d6e-4fc6-bb24-136958cd35bf" providerId="ADAL" clId="{D8254ABB-C07C-4C08-852E-E26457709C20}"/>
     <pc:docChg chg="custSel addSld delSld modSld">
-      <pc:chgData name="Peter" userId="11f48ace-9d6e-4fc6-bb24-136958cd35bf" providerId="ADAL" clId="{D8254ABB-C07C-4C08-852E-E26457709C20}" dt="2021-08-22T09:32:29.462" v="637" actId="20577"/>
+      <pc:chgData name="Peter" userId="11f48ace-9d6e-4fc6-bb24-136958cd35bf" providerId="ADAL" clId="{D8254ABB-C07C-4C08-852E-E26457709C20}" dt="2021-08-23T00:18:46.867" v="1170" actId="20577"/>
       <pc:docMkLst>
         <pc:docMk/>
       </pc:docMkLst>
@@ -259,7 +259,7 @@
         </pc:sldMkLst>
       </pc:sldChg>
       <pc:sldChg chg="modSp mod">
-        <pc:chgData name="Peter" userId="11f48ace-9d6e-4fc6-bb24-136958cd35bf" providerId="ADAL" clId="{D8254ABB-C07C-4C08-852E-E26457709C20}" dt="2021-08-22T09:29:54.600" v="312" actId="20577"/>
+        <pc:chgData name="Peter" userId="11f48ace-9d6e-4fc6-bb24-136958cd35bf" providerId="ADAL" clId="{D8254ABB-C07C-4C08-852E-E26457709C20}" dt="2021-08-23T00:16:46.195" v="890" actId="5793"/>
         <pc:sldMkLst>
           <pc:docMk/>
           <pc:sldMk cId="3018880515" sldId="495"/>
@@ -273,7 +273,7 @@
           </ac:spMkLst>
         </pc:spChg>
         <pc:spChg chg="mod">
-          <ac:chgData name="Peter" userId="11f48ace-9d6e-4fc6-bb24-136958cd35bf" providerId="ADAL" clId="{D8254ABB-C07C-4C08-852E-E26457709C20}" dt="2021-08-22T09:29:54.600" v="312" actId="20577"/>
+          <ac:chgData name="Peter" userId="11f48ace-9d6e-4fc6-bb24-136958cd35bf" providerId="ADAL" clId="{D8254ABB-C07C-4C08-852E-E26457709C20}" dt="2021-08-23T00:16:46.195" v="890" actId="5793"/>
           <ac:spMkLst>
             <pc:docMk/>
             <pc:sldMk cId="3018880515" sldId="495"/>
@@ -295,8 +295,8 @@
           <pc:sldMk cId="298558588" sldId="497"/>
         </pc:sldMkLst>
       </pc:sldChg>
-      <pc:sldChg chg="modSp add mod">
-        <pc:chgData name="Peter" userId="11f48ace-9d6e-4fc6-bb24-136958cd35bf" providerId="ADAL" clId="{D8254ABB-C07C-4C08-852E-E26457709C20}" dt="2021-08-22T09:30:04.111" v="330" actId="20577"/>
+      <pc:sldChg chg="addSp modSp add mod">
+        <pc:chgData name="Peter" userId="11f48ace-9d6e-4fc6-bb24-136958cd35bf" providerId="ADAL" clId="{D8254ABB-C07C-4C08-852E-E26457709C20}" dt="2021-08-23T00:15:59.082" v="809" actId="1076"/>
         <pc:sldMkLst>
           <pc:docMk/>
           <pc:sldMk cId="1366784714" sldId="498"/>
@@ -309,9 +309,25 @@
             <ac:spMk id="19458" creationId="{00000000-0000-0000-0000-000000000000}"/>
           </ac:spMkLst>
         </pc:spChg>
+        <pc:spChg chg="mod">
+          <ac:chgData name="Peter" userId="11f48ace-9d6e-4fc6-bb24-136958cd35bf" providerId="ADAL" clId="{D8254ABB-C07C-4C08-852E-E26457709C20}" dt="2021-08-23T00:14:45.528" v="803" actId="5793"/>
+          <ac:spMkLst>
+            <pc:docMk/>
+            <pc:sldMk cId="1366784714" sldId="498"/>
+            <ac:spMk id="19459" creationId="{00000000-0000-0000-0000-000000000000}"/>
+          </ac:spMkLst>
+        </pc:spChg>
+        <pc:picChg chg="add mod">
+          <ac:chgData name="Peter" userId="11f48ace-9d6e-4fc6-bb24-136958cd35bf" providerId="ADAL" clId="{D8254ABB-C07C-4C08-852E-E26457709C20}" dt="2021-08-23T00:15:59.082" v="809" actId="1076"/>
+          <ac:picMkLst>
+            <pc:docMk/>
+            <pc:sldMk cId="1366784714" sldId="498"/>
+            <ac:picMk id="3" creationId="{282DE430-C6B1-40C0-B633-8D41FD223AF0}"/>
+          </ac:picMkLst>
+        </pc:picChg>
       </pc:sldChg>
       <pc:sldChg chg="modSp add mod">
-        <pc:chgData name="Peter" userId="11f48ace-9d6e-4fc6-bb24-136958cd35bf" providerId="ADAL" clId="{D8254ABB-C07C-4C08-852E-E26457709C20}" dt="2021-08-22T09:30:21.703" v="352" actId="20577"/>
+        <pc:chgData name="Peter" userId="11f48ace-9d6e-4fc6-bb24-136958cd35bf" providerId="ADAL" clId="{D8254ABB-C07C-4C08-852E-E26457709C20}" dt="2021-08-23T00:17:20.484" v="991" actId="20577"/>
         <pc:sldMkLst>
           <pc:docMk/>
           <pc:sldMk cId="3590375924" sldId="499"/>
@@ -324,9 +340,17 @@
             <ac:spMk id="19458" creationId="{00000000-0000-0000-0000-000000000000}"/>
           </ac:spMkLst>
         </pc:spChg>
+        <pc:spChg chg="mod">
+          <ac:chgData name="Peter" userId="11f48ace-9d6e-4fc6-bb24-136958cd35bf" providerId="ADAL" clId="{D8254ABB-C07C-4C08-852E-E26457709C20}" dt="2021-08-23T00:17:20.484" v="991" actId="20577"/>
+          <ac:spMkLst>
+            <pc:docMk/>
+            <pc:sldMk cId="3590375924" sldId="499"/>
+            <ac:spMk id="19459" creationId="{00000000-0000-0000-0000-000000000000}"/>
+          </ac:spMkLst>
+        </pc:spChg>
       </pc:sldChg>
       <pc:sldChg chg="modSp add mod">
-        <pc:chgData name="Peter" userId="11f48ace-9d6e-4fc6-bb24-136958cd35bf" providerId="ADAL" clId="{D8254ABB-C07C-4C08-852E-E26457709C20}" dt="2021-08-22T09:30:43.515" v="408" actId="20577"/>
+        <pc:chgData name="Peter" userId="11f48ace-9d6e-4fc6-bb24-136958cd35bf" providerId="ADAL" clId="{D8254ABB-C07C-4C08-852E-E26457709C20}" dt="2021-08-23T00:18:46.867" v="1170" actId="20577"/>
         <pc:sldMkLst>
           <pc:docMk/>
           <pc:sldMk cId="2133247701" sldId="500"/>
@@ -337,6 +361,14 @@
             <pc:docMk/>
             <pc:sldMk cId="2133247701" sldId="500"/>
             <ac:spMk id="19458" creationId="{00000000-0000-0000-0000-000000000000}"/>
+          </ac:spMkLst>
+        </pc:spChg>
+        <pc:spChg chg="mod">
+          <ac:chgData name="Peter" userId="11f48ace-9d6e-4fc6-bb24-136958cd35bf" providerId="ADAL" clId="{D8254ABB-C07C-4C08-852E-E26457709C20}" dt="2021-08-23T00:18:46.867" v="1170" actId="20577"/>
+          <ac:spMkLst>
+            <pc:docMk/>
+            <pc:sldMk cId="2133247701" sldId="500"/>
+            <ac:spMk id="19459" creationId="{00000000-0000-0000-0000-000000000000}"/>
           </ac:spMkLst>
         </pc:spChg>
       </pc:sldChg>
@@ -12184,12 +12216,15 @@
           <a:bodyPr/>
           <a:lstStyle/>
           <a:p>
+            <a:r>
+              <a:rPr lang="en-AU" altLang="en-US" dirty="0"/>
+              <a:t>A way to synchronously run methods that do not need to finish right away.</a:t>
+            </a:r>
+          </a:p>
+          <a:p>
             <a:pPr marL="0" indent="0">
               <a:buNone/>
             </a:pPr>
-            <a:endParaRPr lang="en-AU" altLang="en-US" dirty="0"/>
-          </a:p>
-          <a:p>
             <a:endParaRPr lang="en-AU" altLang="en-US" dirty="0"/>
           </a:p>
         </p:txBody>
@@ -12265,16 +12300,463 @@
           <a:bodyPr/>
           <a:lstStyle/>
           <a:p>
+            <a:r>
+              <a:rPr lang="en-AU" altLang="en-US" dirty="0"/>
+              <a:t>Provide a way to define data independent of objects that can be hot swapped into objects with defining objects in the inspector.</a:t>
+            </a:r>
+          </a:p>
+          <a:p>
             <a:pPr marL="0" indent="0">
               <a:buNone/>
             </a:pPr>
-            <a:endParaRPr lang="en-AU" altLang="en-US" dirty="0"/>
-          </a:p>
-          <a:p>
+            <a:r>
+              <a:rPr lang="en-US" sz="1800" dirty="0">
+                <a:solidFill>
+                  <a:srgbClr val="000000"/>
+                </a:solidFill>
+                <a:latin typeface="Consolas" panose="020B0609020204030204" pitchFamily="49" charset="0"/>
+              </a:rPr>
+              <a:t>[</a:t>
+            </a:r>
+            <a:r>
+              <a:rPr lang="en-US" sz="1800" dirty="0" err="1">
+                <a:solidFill>
+                  <a:srgbClr val="000000"/>
+                </a:solidFill>
+                <a:latin typeface="Consolas" panose="020B0609020204030204" pitchFamily="49" charset="0"/>
+              </a:rPr>
+              <a:t>CreateAssetMenu</a:t>
+            </a:r>
+            <a:r>
+              <a:rPr lang="en-US" sz="1800" dirty="0">
+                <a:solidFill>
+                  <a:srgbClr val="000000"/>
+                </a:solidFill>
+                <a:latin typeface="Consolas" panose="020B0609020204030204" pitchFamily="49" charset="0"/>
+              </a:rPr>
+              <a:t>(</a:t>
+            </a:r>
+            <a:r>
+              <a:rPr lang="en-US" sz="1800" dirty="0" err="1">
+                <a:solidFill>
+                  <a:srgbClr val="000000"/>
+                </a:solidFill>
+                <a:latin typeface="Consolas" panose="020B0609020204030204" pitchFamily="49" charset="0"/>
+              </a:rPr>
+              <a:t>fileName</a:t>
+            </a:r>
+            <a:r>
+              <a:rPr lang="en-US" sz="1800" dirty="0">
+                <a:solidFill>
+                  <a:srgbClr val="000000"/>
+                </a:solidFill>
+                <a:latin typeface="Consolas" panose="020B0609020204030204" pitchFamily="49" charset="0"/>
+              </a:rPr>
+              <a:t> = </a:t>
+            </a:r>
+            <a:r>
+              <a:rPr lang="en-US" sz="1800" dirty="0">
+                <a:solidFill>
+                  <a:srgbClr val="A31515"/>
+                </a:solidFill>
+                <a:latin typeface="Consolas" panose="020B0609020204030204" pitchFamily="49" charset="0"/>
+              </a:rPr>
+              <a:t>"</a:t>
+            </a:r>
+            <a:r>
+              <a:rPr lang="en-US" sz="1800" dirty="0" err="1">
+                <a:solidFill>
+                  <a:srgbClr val="A31515"/>
+                </a:solidFill>
+                <a:latin typeface="Consolas" panose="020B0609020204030204" pitchFamily="49" charset="0"/>
+              </a:rPr>
+              <a:t>SampleScriptableObject</a:t>
+            </a:r>
+            <a:r>
+              <a:rPr lang="en-US" sz="1800" dirty="0">
+                <a:solidFill>
+                  <a:srgbClr val="A31515"/>
+                </a:solidFill>
+                <a:latin typeface="Consolas" panose="020B0609020204030204" pitchFamily="49" charset="0"/>
+              </a:rPr>
+              <a:t>"</a:t>
+            </a:r>
+            <a:r>
+              <a:rPr lang="en-US" sz="1800" dirty="0">
+                <a:solidFill>
+                  <a:srgbClr val="000000"/>
+                </a:solidFill>
+                <a:latin typeface="Consolas" panose="020B0609020204030204" pitchFamily="49" charset="0"/>
+              </a:rPr>
+              <a:t>, </a:t>
+            </a:r>
+            <a:r>
+              <a:rPr lang="en-US" sz="1800" dirty="0" err="1">
+                <a:solidFill>
+                  <a:srgbClr val="000000"/>
+                </a:solidFill>
+                <a:latin typeface="Consolas" panose="020B0609020204030204" pitchFamily="49" charset="0"/>
+              </a:rPr>
+              <a:t>menuName</a:t>
+            </a:r>
+            <a:r>
+              <a:rPr lang="en-US" sz="1800" dirty="0">
+                <a:solidFill>
+                  <a:srgbClr val="000000"/>
+                </a:solidFill>
+                <a:latin typeface="Consolas" panose="020B0609020204030204" pitchFamily="49" charset="0"/>
+              </a:rPr>
+              <a:t> = </a:t>
+            </a:r>
+            <a:r>
+              <a:rPr lang="en-US" sz="1800" dirty="0">
+                <a:solidFill>
+                  <a:srgbClr val="A31515"/>
+                </a:solidFill>
+                <a:latin typeface="Consolas" panose="020B0609020204030204" pitchFamily="49" charset="0"/>
+              </a:rPr>
+              <a:t>"</a:t>
+            </a:r>
+            <a:r>
+              <a:rPr lang="en-US" sz="1800" dirty="0" err="1">
+                <a:solidFill>
+                  <a:srgbClr val="A31515"/>
+                </a:solidFill>
+                <a:latin typeface="Consolas" panose="020B0609020204030204" pitchFamily="49" charset="0"/>
+              </a:rPr>
+              <a:t>SampleObjects</a:t>
+            </a:r>
+            <a:r>
+              <a:rPr lang="en-US" sz="1800" dirty="0">
+                <a:solidFill>
+                  <a:srgbClr val="A31515"/>
+                </a:solidFill>
+                <a:latin typeface="Consolas" panose="020B0609020204030204" pitchFamily="49" charset="0"/>
+              </a:rPr>
+              <a:t>/</a:t>
+            </a:r>
+            <a:r>
+              <a:rPr lang="en-US" sz="1800" dirty="0" err="1">
+                <a:solidFill>
+                  <a:srgbClr val="A31515"/>
+                </a:solidFill>
+                <a:latin typeface="Consolas" panose="020B0609020204030204" pitchFamily="49" charset="0"/>
+              </a:rPr>
+              <a:t>SampleScriptableObject</a:t>
+            </a:r>
+            <a:r>
+              <a:rPr lang="en-US" sz="1800" dirty="0">
+                <a:solidFill>
+                  <a:srgbClr val="A31515"/>
+                </a:solidFill>
+                <a:latin typeface="Consolas" panose="020B0609020204030204" pitchFamily="49" charset="0"/>
+              </a:rPr>
+              <a:t>"</a:t>
+            </a:r>
+            <a:r>
+              <a:rPr lang="en-US" sz="1800" dirty="0">
+                <a:solidFill>
+                  <a:srgbClr val="000000"/>
+                </a:solidFill>
+                <a:latin typeface="Consolas" panose="020B0609020204030204" pitchFamily="49" charset="0"/>
+              </a:rPr>
+              <a:t>, order = 1)]</a:t>
+            </a:r>
+          </a:p>
+          <a:p>
+            <a:pPr marL="0" indent="0">
+              <a:buNone/>
+            </a:pPr>
+            <a:r>
+              <a:rPr lang="en-US" sz="1800" dirty="0">
+                <a:solidFill>
+                  <a:srgbClr val="0000FF"/>
+                </a:solidFill>
+                <a:latin typeface="Consolas" panose="020B0609020204030204" pitchFamily="49" charset="0"/>
+              </a:rPr>
+              <a:t>public</a:t>
+            </a:r>
+            <a:r>
+              <a:rPr lang="en-US" sz="1800" dirty="0">
+                <a:solidFill>
+                  <a:srgbClr val="000000"/>
+                </a:solidFill>
+                <a:latin typeface="Consolas" panose="020B0609020204030204" pitchFamily="49" charset="0"/>
+              </a:rPr>
+              <a:t> </a:t>
+            </a:r>
+            <a:r>
+              <a:rPr lang="en-US" sz="1800" dirty="0">
+                <a:solidFill>
+                  <a:srgbClr val="0000FF"/>
+                </a:solidFill>
+                <a:latin typeface="Consolas" panose="020B0609020204030204" pitchFamily="49" charset="0"/>
+              </a:rPr>
+              <a:t>class</a:t>
+            </a:r>
+            <a:r>
+              <a:rPr lang="en-US" sz="1800" dirty="0">
+                <a:solidFill>
+                  <a:srgbClr val="000000"/>
+                </a:solidFill>
+                <a:latin typeface="Consolas" panose="020B0609020204030204" pitchFamily="49" charset="0"/>
+              </a:rPr>
+              <a:t> </a:t>
+            </a:r>
+            <a:r>
+              <a:rPr lang="en-US" sz="1800" dirty="0" err="1">
+                <a:solidFill>
+                  <a:srgbClr val="2B91AF"/>
+                </a:solidFill>
+                <a:latin typeface="Consolas" panose="020B0609020204030204" pitchFamily="49" charset="0"/>
+              </a:rPr>
+              <a:t>SampleScriptableObject</a:t>
+            </a:r>
+            <a:r>
+              <a:rPr lang="en-US" sz="1800" dirty="0">
+                <a:solidFill>
+                  <a:srgbClr val="000000"/>
+                </a:solidFill>
+                <a:latin typeface="Consolas" panose="020B0609020204030204" pitchFamily="49" charset="0"/>
+              </a:rPr>
+              <a:t> : </a:t>
+            </a:r>
+            <a:r>
+              <a:rPr lang="en-US" sz="1800" dirty="0" err="1">
+                <a:solidFill>
+                  <a:srgbClr val="000000"/>
+                </a:solidFill>
+                <a:latin typeface="Consolas" panose="020B0609020204030204" pitchFamily="49" charset="0"/>
+              </a:rPr>
+              <a:t>ScriptableObject</a:t>
+            </a:r>
+            <a:endParaRPr lang="en-US" sz="1800" dirty="0">
+              <a:solidFill>
+                <a:srgbClr val="000000"/>
+              </a:solidFill>
+              <a:latin typeface="Consolas" panose="020B0609020204030204" pitchFamily="49" charset="0"/>
+            </a:endParaRPr>
+          </a:p>
+          <a:p>
+            <a:pPr marL="0" indent="0">
+              <a:buNone/>
+            </a:pPr>
+            <a:r>
+              <a:rPr lang="en-US" sz="1800" dirty="0">
+                <a:solidFill>
+                  <a:srgbClr val="000000"/>
+                </a:solidFill>
+                <a:latin typeface="Consolas" panose="020B0609020204030204" pitchFamily="49" charset="0"/>
+              </a:rPr>
+              <a:t>{</a:t>
+            </a:r>
+          </a:p>
+          <a:p>
+            <a:pPr marL="400050" lvl="1" indent="0">
+              <a:buNone/>
+            </a:pPr>
+            <a:r>
+              <a:rPr lang="en-US" sz="1800" dirty="0">
+                <a:solidFill>
+                  <a:srgbClr val="0000FF"/>
+                </a:solidFill>
+                <a:latin typeface="Consolas" panose="020B0609020204030204" pitchFamily="49" charset="0"/>
+              </a:rPr>
+              <a:t>public</a:t>
+            </a:r>
+            <a:r>
+              <a:rPr lang="en-US" sz="1800" dirty="0">
+                <a:solidFill>
+                  <a:srgbClr val="000000"/>
+                </a:solidFill>
+                <a:latin typeface="Consolas" panose="020B0609020204030204" pitchFamily="49" charset="0"/>
+              </a:rPr>
+              <a:t> </a:t>
+            </a:r>
+            <a:r>
+              <a:rPr lang="en-US" sz="1800" dirty="0">
+                <a:solidFill>
+                  <a:srgbClr val="0000FF"/>
+                </a:solidFill>
+                <a:latin typeface="Consolas" panose="020B0609020204030204" pitchFamily="49" charset="0"/>
+              </a:rPr>
+              <a:t>string</a:t>
+            </a:r>
+            <a:r>
+              <a:rPr lang="en-US" sz="1800" dirty="0">
+                <a:solidFill>
+                  <a:srgbClr val="000000"/>
+                </a:solidFill>
+                <a:latin typeface="Consolas" panose="020B0609020204030204" pitchFamily="49" charset="0"/>
+              </a:rPr>
+              <a:t> </a:t>
+            </a:r>
+            <a:r>
+              <a:rPr lang="en-US" sz="1800" dirty="0" err="1">
+                <a:solidFill>
+                  <a:srgbClr val="000000"/>
+                </a:solidFill>
+                <a:latin typeface="Consolas" panose="020B0609020204030204" pitchFamily="49" charset="0"/>
+              </a:rPr>
+              <a:t>someStringData</a:t>
+            </a:r>
+            <a:r>
+              <a:rPr lang="en-US" sz="1800" dirty="0">
+                <a:solidFill>
+                  <a:srgbClr val="000000"/>
+                </a:solidFill>
+                <a:latin typeface="Consolas" panose="020B0609020204030204" pitchFamily="49" charset="0"/>
+              </a:rPr>
+              <a:t>;</a:t>
+            </a:r>
+          </a:p>
+          <a:p>
+            <a:pPr marL="400050" lvl="1" indent="0">
+              <a:buNone/>
+            </a:pPr>
+            <a:r>
+              <a:rPr lang="en-US" sz="1800" dirty="0">
+                <a:solidFill>
+                  <a:srgbClr val="0000FF"/>
+                </a:solidFill>
+                <a:latin typeface="Consolas" panose="020B0609020204030204" pitchFamily="49" charset="0"/>
+              </a:rPr>
+              <a:t>public</a:t>
+            </a:r>
+            <a:r>
+              <a:rPr lang="en-US" sz="1800" dirty="0">
+                <a:solidFill>
+                  <a:srgbClr val="000000"/>
+                </a:solidFill>
+                <a:latin typeface="Consolas" panose="020B0609020204030204" pitchFamily="49" charset="0"/>
+              </a:rPr>
+              <a:t> </a:t>
+            </a:r>
+            <a:r>
+              <a:rPr lang="en-US" sz="1800" dirty="0">
+                <a:solidFill>
+                  <a:srgbClr val="0000FF"/>
+                </a:solidFill>
+                <a:latin typeface="Consolas" panose="020B0609020204030204" pitchFamily="49" charset="0"/>
+              </a:rPr>
+              <a:t>int</a:t>
+            </a:r>
+            <a:r>
+              <a:rPr lang="en-US" sz="1800" dirty="0">
+                <a:solidFill>
+                  <a:srgbClr val="000000"/>
+                </a:solidFill>
+                <a:latin typeface="Consolas" panose="020B0609020204030204" pitchFamily="49" charset="0"/>
+              </a:rPr>
+              <a:t> </a:t>
+            </a:r>
+            <a:r>
+              <a:rPr lang="en-US" sz="1800" dirty="0" err="1">
+                <a:solidFill>
+                  <a:srgbClr val="000000"/>
+                </a:solidFill>
+                <a:latin typeface="Consolas" panose="020B0609020204030204" pitchFamily="49" charset="0"/>
+              </a:rPr>
+              <a:t>someIntValue</a:t>
+            </a:r>
+            <a:r>
+              <a:rPr lang="en-US" sz="1800" dirty="0">
+                <a:solidFill>
+                  <a:srgbClr val="000000"/>
+                </a:solidFill>
+                <a:latin typeface="Consolas" panose="020B0609020204030204" pitchFamily="49" charset="0"/>
+              </a:rPr>
+              <a:t>;</a:t>
+            </a:r>
+          </a:p>
+          <a:p>
+            <a:pPr marL="400050" lvl="1" indent="0">
+              <a:buNone/>
+            </a:pPr>
+            <a:r>
+              <a:rPr lang="en-US" sz="1800" dirty="0">
+                <a:solidFill>
+                  <a:srgbClr val="0000FF"/>
+                </a:solidFill>
+                <a:latin typeface="Consolas" panose="020B0609020204030204" pitchFamily="49" charset="0"/>
+              </a:rPr>
+              <a:t>public</a:t>
+            </a:r>
+            <a:r>
+              <a:rPr lang="en-US" sz="1800" dirty="0">
+                <a:solidFill>
+                  <a:srgbClr val="000000"/>
+                </a:solidFill>
+                <a:latin typeface="Consolas" panose="020B0609020204030204" pitchFamily="49" charset="0"/>
+              </a:rPr>
+              <a:t> Vector3[] </a:t>
+            </a:r>
+            <a:r>
+              <a:rPr lang="en-US" sz="1800" dirty="0" err="1">
+                <a:solidFill>
+                  <a:srgbClr val="000000"/>
+                </a:solidFill>
+                <a:latin typeface="Consolas" panose="020B0609020204030204" pitchFamily="49" charset="0"/>
+              </a:rPr>
+              <a:t>someListOfPoints</a:t>
+            </a:r>
+            <a:r>
+              <a:rPr lang="en-US" sz="1800" dirty="0">
+                <a:solidFill>
+                  <a:srgbClr val="000000"/>
+                </a:solidFill>
+                <a:latin typeface="Consolas" panose="020B0609020204030204" pitchFamily="49" charset="0"/>
+              </a:rPr>
+              <a:t>;</a:t>
+            </a:r>
+          </a:p>
+          <a:p>
+            <a:pPr marL="0" indent="0">
+              <a:buNone/>
+            </a:pPr>
+            <a:r>
+              <a:rPr lang="en-US" sz="1800" dirty="0">
+                <a:solidFill>
+                  <a:srgbClr val="000000"/>
+                </a:solidFill>
+                <a:latin typeface="Consolas" panose="020B0609020204030204" pitchFamily="49" charset="0"/>
+              </a:rPr>
+              <a:t>}</a:t>
+            </a:r>
             <a:endParaRPr lang="en-AU" altLang="en-US" dirty="0"/>
           </a:p>
         </p:txBody>
       </p:sp>
+      <p:pic>
+        <p:nvPicPr>
+          <p:cNvPr id="3" name="Picture 2" descr="Graphical user interface, text, application&#10;&#10;Description automatically generated">
+            <a:extLst>
+              <a:ext uri="{FF2B5EF4-FFF2-40B4-BE49-F238E27FC236}">
+                <a16:creationId xmlns:a16="http://schemas.microsoft.com/office/drawing/2014/main" id="{282DE430-C6B1-40C0-B633-8D41FD223AF0}"/>
+              </a:ext>
+            </a:extLst>
+          </p:cNvPr>
+          <p:cNvPicPr>
+            <a:picLocks noChangeAspect="1"/>
+          </p:cNvPicPr>
+          <p:nvPr/>
+        </p:nvPicPr>
+        <p:blipFill>
+          <a:blip r:embed="rId3"/>
+          <a:stretch>
+            <a:fillRect/>
+          </a:stretch>
+        </p:blipFill>
+        <p:spPr>
+          <a:xfrm>
+            <a:off x="6248400" y="3688786"/>
+            <a:ext cx="4400550" cy="1532699"/>
+          </a:xfrm>
+          <a:prstGeom prst="rect">
+            <a:avLst/>
+          </a:prstGeom>
+        </p:spPr>
+      </p:pic>
     </p:spTree>
     <p:custDataLst>
       <p:tags r:id="rId1"/>
@@ -12346,13 +12828,40 @@
           <a:bodyPr/>
           <a:lstStyle/>
           <a:p>
-            <a:pPr marL="0" indent="0">
-              <a:buNone/>
-            </a:pPr>
-            <a:endParaRPr lang="en-AU" altLang="en-US" dirty="0"/>
-          </a:p>
-          <a:p>
-            <a:endParaRPr lang="en-AU" altLang="en-US" dirty="0"/>
+            <a:r>
+              <a:rPr lang="en-AU" altLang="en-US" dirty="0"/>
+              <a:t>Singleton Pattern</a:t>
+            </a:r>
+          </a:p>
+          <a:p>
+            <a:r>
+              <a:rPr lang="en-AU" altLang="en-US" dirty="0"/>
+              <a:t>Observer Pattern</a:t>
+            </a:r>
+          </a:p>
+          <a:p>
+            <a:r>
+              <a:rPr lang="en-AU" altLang="en-US" dirty="0"/>
+              <a:t>Command Pattern</a:t>
+            </a:r>
+          </a:p>
+          <a:p>
+            <a:r>
+              <a:rPr lang="en-AU" altLang="en-US" dirty="0"/>
+              <a:t>Component Pattern</a:t>
+            </a:r>
+          </a:p>
+          <a:p>
+            <a:r>
+              <a:rPr lang="en-AU" altLang="en-US" dirty="0"/>
+              <a:t>Flyweight Pattern</a:t>
+            </a:r>
+          </a:p>
+          <a:p>
+            <a:r>
+              <a:rPr lang="en-AU" altLang="en-US" dirty="0"/>
+              <a:t>State Pattern</a:t>
+            </a:r>
           </a:p>
         </p:txBody>
       </p:sp>
@@ -12427,13 +12936,58 @@
           <a:bodyPr/>
           <a:lstStyle/>
           <a:p>
-            <a:pPr marL="0" indent="0">
-              <a:buNone/>
-            </a:pPr>
-            <a:endParaRPr lang="en-AU" altLang="en-US" dirty="0"/>
-          </a:p>
-          <a:p>
-            <a:endParaRPr lang="en-AU" altLang="en-US" dirty="0"/>
+            <a:r>
+              <a:rPr lang="en-AU" altLang="en-US" dirty="0"/>
+              <a:t>[S]ingle Responsibility Principle</a:t>
+            </a:r>
+          </a:p>
+          <a:p>
+            <a:r>
+              <a:rPr lang="en-AU" altLang="en-US" dirty="0"/>
+              <a:t>[O]pen Closed Principle</a:t>
+            </a:r>
+          </a:p>
+          <a:p>
+            <a:r>
+              <a:rPr lang="en-AU" altLang="en-US" dirty="0"/>
+              <a:t>[L]</a:t>
+            </a:r>
+            <a:r>
+              <a:rPr lang="en-AU" altLang="en-US" dirty="0" err="1"/>
+              <a:t>iskov</a:t>
+            </a:r>
+            <a:r>
+              <a:rPr lang="en-AU" altLang="en-US" dirty="0"/>
+              <a:t> Substitution Principle</a:t>
+            </a:r>
+          </a:p>
+          <a:p>
+            <a:r>
+              <a:rPr lang="en-AU" altLang="en-US" dirty="0"/>
+              <a:t>[I]</a:t>
+            </a:r>
+            <a:r>
+              <a:rPr lang="en-AU" altLang="en-US" dirty="0" err="1"/>
+              <a:t>nterface</a:t>
+            </a:r>
+            <a:r>
+              <a:rPr lang="en-AU" altLang="en-US" dirty="0"/>
+              <a:t> Segregation Principle</a:t>
+            </a:r>
+          </a:p>
+          <a:p>
+            <a:r>
+              <a:rPr lang="en-AU" altLang="en-US" dirty="0"/>
+              <a:t>[D]</a:t>
+            </a:r>
+            <a:r>
+              <a:rPr lang="en-AU" altLang="en-US" dirty="0" err="1"/>
+              <a:t>ependency</a:t>
+            </a:r>
+            <a:r>
+              <a:rPr lang="en-AU" altLang="en-US" dirty="0"/>
+              <a:t> Inversion Principle</a:t>
+            </a:r>
           </a:p>
         </p:txBody>
       </p:sp>

</xml_diff>

<commit_message>
Finalised content for primary lecture materials. Extended status effect tooltip data and implemented projectile attack types.
</commit_message>
<xml_diff>
--- a/Lecture4.pptx
+++ b/Lecture4.pptx
@@ -11,26 +11,27 @@
     <p:sldMasterId id="2147484903" r:id="rId7"/>
   </p:sldMasterIdLst>
   <p:notesMasterIdLst>
-    <p:notesMasterId r:id="rId17"/>
+    <p:notesMasterId r:id="rId18"/>
   </p:notesMasterIdLst>
   <p:handoutMasterIdLst>
-    <p:handoutMasterId r:id="rId18"/>
+    <p:handoutMasterId r:id="rId19"/>
   </p:handoutMasterIdLst>
   <p:sldIdLst>
     <p:sldId id="449" r:id="rId8"/>
     <p:sldId id="483" r:id="rId9"/>
     <p:sldId id="495" r:id="rId10"/>
-    <p:sldId id="498" r:id="rId11"/>
-    <p:sldId id="499" r:id="rId12"/>
-    <p:sldId id="500" r:id="rId13"/>
-    <p:sldId id="501" r:id="rId14"/>
-    <p:sldId id="502" r:id="rId15"/>
-    <p:sldId id="491" r:id="rId16"/>
+    <p:sldId id="503" r:id="rId11"/>
+    <p:sldId id="498" r:id="rId12"/>
+    <p:sldId id="499" r:id="rId13"/>
+    <p:sldId id="500" r:id="rId14"/>
+    <p:sldId id="501" r:id="rId15"/>
+    <p:sldId id="502" r:id="rId16"/>
+    <p:sldId id="491" r:id="rId17"/>
   </p:sldIdLst>
   <p:sldSz cx="12192000" cy="6858000"/>
   <p:notesSz cx="7099300" cy="10234613"/>
   <p:custDataLst>
-    <p:tags r:id="rId19"/>
+    <p:tags r:id="rId20"/>
   </p:custDataLst>
   <p:defaultTextStyle>
     <a:defPPr>
@@ -180,8 +181,8 @@
 <pc:chgInfo xmlns:a="http://schemas.openxmlformats.org/drawingml/2006/main" xmlns:r="http://schemas.openxmlformats.org/officeDocument/2006/relationships" xmlns:ac="http://schemas.microsoft.com/office/drawing/2013/main/command" xmlns:pc="http://schemas.microsoft.com/office/powerpoint/2013/main/command">
   <pc:docChgLst>
     <pc:chgData name="Peter" userId="11f48ace-9d6e-4fc6-bb24-136958cd35bf" providerId="ADAL" clId="{D8254ABB-C07C-4C08-852E-E26457709C20}"/>
-    <pc:docChg chg="custSel addSld delSld modSld">
-      <pc:chgData name="Peter" userId="11f48ace-9d6e-4fc6-bb24-136958cd35bf" providerId="ADAL" clId="{D8254ABB-C07C-4C08-852E-E26457709C20}" dt="2021-08-23T00:18:46.867" v="1170" actId="20577"/>
+    <pc:docChg chg="undo custSel addSld delSld modSld">
+      <pc:chgData name="Peter" userId="11f48ace-9d6e-4fc6-bb24-136958cd35bf" providerId="ADAL" clId="{D8254ABB-C07C-4C08-852E-E26457709C20}" dt="2021-08-23T09:54:31.141" v="2025" actId="20577"/>
       <pc:docMkLst>
         <pc:docMk/>
       </pc:docMkLst>
@@ -259,7 +260,7 @@
         </pc:sldMkLst>
       </pc:sldChg>
       <pc:sldChg chg="modSp mod">
-        <pc:chgData name="Peter" userId="11f48ace-9d6e-4fc6-bb24-136958cd35bf" providerId="ADAL" clId="{D8254ABB-C07C-4C08-852E-E26457709C20}" dt="2021-08-23T00:16:46.195" v="890" actId="5793"/>
+        <pc:chgData name="Peter" userId="11f48ace-9d6e-4fc6-bb24-136958cd35bf" providerId="ADAL" clId="{D8254ABB-C07C-4C08-852E-E26457709C20}" dt="2021-08-23T09:47:16.208" v="1317" actId="20577"/>
         <pc:sldMkLst>
           <pc:docMk/>
           <pc:sldMk cId="3018880515" sldId="495"/>
@@ -273,7 +274,7 @@
           </ac:spMkLst>
         </pc:spChg>
         <pc:spChg chg="mod">
-          <ac:chgData name="Peter" userId="11f48ace-9d6e-4fc6-bb24-136958cd35bf" providerId="ADAL" clId="{D8254ABB-C07C-4C08-852E-E26457709C20}" dt="2021-08-23T00:16:46.195" v="890" actId="5793"/>
+          <ac:chgData name="Peter" userId="11f48ace-9d6e-4fc6-bb24-136958cd35bf" providerId="ADAL" clId="{D8254ABB-C07C-4C08-852E-E26457709C20}" dt="2021-08-23T09:47:16.208" v="1317" actId="20577"/>
           <ac:spMkLst>
             <pc:docMk/>
             <pc:sldMk cId="3018880515" sldId="495"/>
@@ -350,7 +351,7 @@
         </pc:spChg>
       </pc:sldChg>
       <pc:sldChg chg="modSp add mod">
-        <pc:chgData name="Peter" userId="11f48ace-9d6e-4fc6-bb24-136958cd35bf" providerId="ADAL" clId="{D8254ABB-C07C-4C08-852E-E26457709C20}" dt="2021-08-23T00:18:46.867" v="1170" actId="20577"/>
+        <pc:chgData name="Peter" userId="11f48ace-9d6e-4fc6-bb24-136958cd35bf" providerId="ADAL" clId="{D8254ABB-C07C-4C08-852E-E26457709C20}" dt="2021-08-23T09:54:31.141" v="2025" actId="20577"/>
         <pc:sldMkLst>
           <pc:docMk/>
           <pc:sldMk cId="2133247701" sldId="500"/>
@@ -364,7 +365,7 @@
           </ac:spMkLst>
         </pc:spChg>
         <pc:spChg chg="mod">
-          <ac:chgData name="Peter" userId="11f48ace-9d6e-4fc6-bb24-136958cd35bf" providerId="ADAL" clId="{D8254ABB-C07C-4C08-852E-E26457709C20}" dt="2021-08-23T00:18:46.867" v="1170" actId="20577"/>
+          <ac:chgData name="Peter" userId="11f48ace-9d6e-4fc6-bb24-136958cd35bf" providerId="ADAL" clId="{D8254ABB-C07C-4C08-852E-E26457709C20}" dt="2021-08-23T09:54:31.141" v="2025" actId="20577"/>
           <ac:spMkLst>
             <pc:docMk/>
             <pc:sldMk cId="2133247701" sldId="500"/>
@@ -372,8 +373,8 @@
           </ac:spMkLst>
         </pc:spChg>
       </pc:sldChg>
-      <pc:sldChg chg="modSp add mod">
-        <pc:chgData name="Peter" userId="11f48ace-9d6e-4fc6-bb24-136958cd35bf" providerId="ADAL" clId="{D8254ABB-C07C-4C08-852E-E26457709C20}" dt="2021-08-22T09:30:52.695" v="421" actId="20577"/>
+      <pc:sldChg chg="addSp modSp add mod">
+        <pc:chgData name="Peter" userId="11f48ace-9d6e-4fc6-bb24-136958cd35bf" providerId="ADAL" clId="{D8254ABB-C07C-4C08-852E-E26457709C20}" dt="2021-08-23T04:40:22.429" v="1176" actId="1076"/>
         <pc:sldMkLst>
           <pc:docMk/>
           <pc:sldMk cId="250492798" sldId="501"/>
@@ -386,9 +387,17 @@
             <ac:spMk id="19458" creationId="{00000000-0000-0000-0000-000000000000}"/>
           </ac:spMkLst>
         </pc:spChg>
+        <pc:picChg chg="add mod">
+          <ac:chgData name="Peter" userId="11f48ace-9d6e-4fc6-bb24-136958cd35bf" providerId="ADAL" clId="{D8254ABB-C07C-4C08-852E-E26457709C20}" dt="2021-08-23T04:40:22.429" v="1176" actId="1076"/>
+          <ac:picMkLst>
+            <pc:docMk/>
+            <pc:sldMk cId="250492798" sldId="501"/>
+            <ac:picMk id="3" creationId="{F982D5C6-EAA0-4E75-9839-D3F71065A9EF}"/>
+          </ac:picMkLst>
+        </pc:picChg>
       </pc:sldChg>
       <pc:sldChg chg="modSp add mod">
-        <pc:chgData name="Peter" userId="11f48ace-9d6e-4fc6-bb24-136958cd35bf" providerId="ADAL" clId="{D8254ABB-C07C-4C08-852E-E26457709C20}" dt="2021-08-22T09:31:05.483" v="450" actId="20577"/>
+        <pc:chgData name="Peter" userId="11f48ace-9d6e-4fc6-bb24-136958cd35bf" providerId="ADAL" clId="{D8254ABB-C07C-4C08-852E-E26457709C20}" dt="2021-08-23T07:00:55.640" v="1264" actId="20577"/>
         <pc:sldMkLst>
           <pc:docMk/>
           <pc:sldMk cId="1538088131" sldId="502"/>
@@ -399,6 +408,45 @@
             <pc:docMk/>
             <pc:sldMk cId="1538088131" sldId="502"/>
             <ac:spMk id="19458" creationId="{00000000-0000-0000-0000-000000000000}"/>
+          </ac:spMkLst>
+        </pc:spChg>
+        <pc:spChg chg="mod">
+          <ac:chgData name="Peter" userId="11f48ace-9d6e-4fc6-bb24-136958cd35bf" providerId="ADAL" clId="{D8254ABB-C07C-4C08-852E-E26457709C20}" dt="2021-08-23T07:00:55.640" v="1264" actId="20577"/>
+          <ac:spMkLst>
+            <pc:docMk/>
+            <pc:sldMk cId="1538088131" sldId="502"/>
+            <ac:spMk id="19459" creationId="{00000000-0000-0000-0000-000000000000}"/>
+          </ac:spMkLst>
+        </pc:spChg>
+      </pc:sldChg>
+      <pc:sldChg chg="delSp modSp new mod">
+        <pc:chgData name="Peter" userId="11f48ace-9d6e-4fc6-bb24-136958cd35bf" providerId="ADAL" clId="{D8254ABB-C07C-4C08-852E-E26457709C20}" dt="2021-08-23T09:48:24.286" v="1343" actId="15"/>
+        <pc:sldMkLst>
+          <pc:docMk/>
+          <pc:sldMk cId="2887586209" sldId="503"/>
+        </pc:sldMkLst>
+        <pc:spChg chg="mod">
+          <ac:chgData name="Peter" userId="11f48ace-9d6e-4fc6-bb24-136958cd35bf" providerId="ADAL" clId="{D8254ABB-C07C-4C08-852E-E26457709C20}" dt="2021-08-23T09:48:24.286" v="1343" actId="15"/>
+          <ac:spMkLst>
+            <pc:docMk/>
+            <pc:sldMk cId="2887586209" sldId="503"/>
+            <ac:spMk id="2" creationId="{73FA9E51-D968-437D-B351-5B36DD7DA5F1}"/>
+          </ac:spMkLst>
+        </pc:spChg>
+        <pc:spChg chg="del">
+          <ac:chgData name="Peter" userId="11f48ace-9d6e-4fc6-bb24-136958cd35bf" providerId="ADAL" clId="{D8254ABB-C07C-4C08-852E-E26457709C20}" dt="2021-08-23T09:48:02.234" v="1330" actId="478"/>
+          <ac:spMkLst>
+            <pc:docMk/>
+            <pc:sldMk cId="2887586209" sldId="503"/>
+            <ac:spMk id="3" creationId="{84C28519-8148-4C8E-9062-957EFD2D776B}"/>
+          </ac:spMkLst>
+        </pc:spChg>
+        <pc:spChg chg="mod">
+          <ac:chgData name="Peter" userId="11f48ace-9d6e-4fc6-bb24-136958cd35bf" providerId="ADAL" clId="{D8254ABB-C07C-4C08-852E-E26457709C20}" dt="2021-08-23T09:47:56.675" v="1328" actId="20577"/>
+          <ac:spMkLst>
+            <pc:docMk/>
+            <pc:sldMk cId="2887586209" sldId="503"/>
+            <ac:spMk id="4" creationId="{D1759E5F-ED71-4626-B518-4B2884FDC5D9}"/>
           </ac:spMkLst>
         </pc:spChg>
       </pc:sldChg>
@@ -12036,6 +12084,111 @@
 </p:sld>
 </file>
 
+<file path=ppt/slides/slide10.xml><?xml version="1.0" encoding="utf-8"?>
+<p:sld xmlns:a="http://schemas.openxmlformats.org/drawingml/2006/main" xmlns:r="http://schemas.openxmlformats.org/officeDocument/2006/relationships" xmlns:p="http://schemas.openxmlformats.org/presentationml/2006/main">
+  <p:cSld>
+    <p:spTree>
+      <p:nvGrpSpPr>
+        <p:cNvPr id="1" name=""/>
+        <p:cNvGrpSpPr/>
+        <p:nvPr/>
+      </p:nvGrpSpPr>
+      <p:grpSpPr>
+        <a:xfrm>
+          <a:off x="0" y="0"/>
+          <a:ext cx="0" cy="0"/>
+          <a:chOff x="0" y="0"/>
+          <a:chExt cx="0" cy="0"/>
+        </a:xfrm>
+      </p:grpSpPr>
+      <p:sp>
+        <p:nvSpPr>
+          <p:cNvPr id="19458" name="Title 1"/>
+          <p:cNvSpPr>
+            <a:spLocks noGrp="1"/>
+          </p:cNvSpPr>
+          <p:nvPr>
+            <p:ph type="title"/>
+          </p:nvPr>
+        </p:nvSpPr>
+        <p:spPr/>
+        <p:txBody>
+          <a:bodyPr/>
+          <a:lstStyle/>
+          <a:p>
+            <a:r>
+              <a:rPr lang="en-US" altLang="en-US" dirty="0"/>
+              <a:t>Any Questions?</a:t>
+            </a:r>
+            <a:endParaRPr lang="en-AU" altLang="en-US" dirty="0"/>
+          </a:p>
+        </p:txBody>
+      </p:sp>
+      <p:sp>
+        <p:nvSpPr>
+          <p:cNvPr id="19459" name="Subtitle 2"/>
+          <p:cNvSpPr>
+            <a:spLocks noGrp="1"/>
+          </p:cNvSpPr>
+          <p:nvPr>
+            <p:ph idx="1"/>
+          </p:nvPr>
+        </p:nvSpPr>
+        <p:spPr/>
+        <p:txBody>
+          <a:bodyPr/>
+          <a:lstStyle/>
+          <a:p>
+            <a:r>
+              <a:rPr lang="en-AU" altLang="en-US" dirty="0"/>
+              <a:t>Further reading with references to a lot of content I talked about can be found in the PDF version to go with this talk.</a:t>
+            </a:r>
+          </a:p>
+          <a:p>
+            <a:r>
+              <a:rPr lang="en-AU" altLang="en-US" dirty="0"/>
+              <a:t>Welcome to send me a message or ask during the Wednesday session if you have any questions about the content. Time permitting, I may give suggestions or suggest sources to look at.</a:t>
+            </a:r>
+          </a:p>
+          <a:p>
+            <a:endParaRPr lang="en-AU" altLang="en-US" dirty="0"/>
+          </a:p>
+          <a:p>
+            <a:endParaRPr lang="en-AU" altLang="en-US" dirty="0"/>
+          </a:p>
+          <a:p>
+            <a:pPr marL="0" indent="0">
+              <a:buNone/>
+            </a:pPr>
+            <a:endParaRPr lang="en-AU" altLang="en-US" dirty="0"/>
+          </a:p>
+          <a:p>
+            <a:pPr marL="0" indent="0">
+              <a:buNone/>
+            </a:pPr>
+            <a:endParaRPr lang="en-AU" altLang="en-US" dirty="0"/>
+          </a:p>
+          <a:p>
+            <a:endParaRPr lang="en-AU" altLang="en-US" dirty="0"/>
+          </a:p>
+        </p:txBody>
+      </p:sp>
+    </p:spTree>
+    <p:custDataLst>
+      <p:tags r:id="rId1"/>
+    </p:custDataLst>
+    <p:extLst>
+      <p:ext uri="{BB962C8B-B14F-4D97-AF65-F5344CB8AC3E}">
+        <p14:creationId xmlns:p14="http://schemas.microsoft.com/office/powerpoint/2010/main" val="3739730983"/>
+      </p:ext>
+    </p:extLst>
+  </p:cSld>
+  <p:clrMapOvr>
+    <a:masterClrMapping/>
+  </p:clrMapOvr>
+</p:sld>
+</file>
+
 <file path=ppt/slides/slide2.xml><?xml version="1.0" encoding="utf-8"?>
 <p:sld xmlns:a="http://schemas.openxmlformats.org/drawingml/2006/main" xmlns:r="http://schemas.openxmlformats.org/officeDocument/2006/relationships" xmlns:p="http://schemas.openxmlformats.org/presentationml/2006/main">
   <p:cSld>
@@ -12225,6 +12378,574 @@
             <a:pPr marL="0" indent="0">
               <a:buNone/>
             </a:pPr>
+            <a:r>
+              <a:rPr lang="en-US" sz="1800" dirty="0">
+                <a:solidFill>
+                  <a:srgbClr val="0000FF"/>
+                </a:solidFill>
+                <a:latin typeface="Consolas" panose="020B0609020204030204" pitchFamily="49" charset="0"/>
+              </a:rPr>
+              <a:t>private</a:t>
+            </a:r>
+            <a:r>
+              <a:rPr lang="en-US" sz="1800" dirty="0">
+                <a:solidFill>
+                  <a:srgbClr val="000000"/>
+                </a:solidFill>
+                <a:latin typeface="Consolas" panose="020B0609020204030204" pitchFamily="49" charset="0"/>
+              </a:rPr>
+              <a:t> </a:t>
+            </a:r>
+            <a:r>
+              <a:rPr lang="en-US" sz="1800" dirty="0" err="1">
+                <a:solidFill>
+                  <a:srgbClr val="000000"/>
+                </a:solidFill>
+                <a:latin typeface="Consolas" panose="020B0609020204030204" pitchFamily="49" charset="0"/>
+              </a:rPr>
+              <a:t>IEnumerator</a:t>
+            </a:r>
+            <a:r>
+              <a:rPr lang="en-US" sz="1800" dirty="0">
+                <a:solidFill>
+                  <a:srgbClr val="000000"/>
+                </a:solidFill>
+                <a:latin typeface="Consolas" panose="020B0609020204030204" pitchFamily="49" charset="0"/>
+              </a:rPr>
+              <a:t> </a:t>
+            </a:r>
+            <a:r>
+              <a:rPr lang="en-US" sz="1800" dirty="0" err="1">
+                <a:solidFill>
+                  <a:srgbClr val="000000"/>
+                </a:solidFill>
+                <a:latin typeface="Consolas" panose="020B0609020204030204" pitchFamily="49" charset="0"/>
+              </a:rPr>
+              <a:t>movePlaces</a:t>
+            </a:r>
+            <a:r>
+              <a:rPr lang="en-US" sz="1800" dirty="0">
+                <a:solidFill>
+                  <a:srgbClr val="000000"/>
+                </a:solidFill>
+                <a:latin typeface="Consolas" panose="020B0609020204030204" pitchFamily="49" charset="0"/>
+              </a:rPr>
+              <a:t>()</a:t>
+            </a:r>
+          </a:p>
+          <a:p>
+            <a:pPr marL="0" indent="0">
+              <a:buNone/>
+            </a:pPr>
+            <a:r>
+              <a:rPr lang="en-US" sz="1800" dirty="0">
+                <a:solidFill>
+                  <a:srgbClr val="000000"/>
+                </a:solidFill>
+                <a:latin typeface="Consolas" panose="020B0609020204030204" pitchFamily="49" charset="0"/>
+              </a:rPr>
+              <a:t>{</a:t>
+            </a:r>
+          </a:p>
+          <a:p>
+            <a:pPr marL="0" indent="0">
+              <a:buNone/>
+            </a:pPr>
+            <a:r>
+              <a:rPr lang="en-US" sz="1800" dirty="0">
+                <a:solidFill>
+                  <a:srgbClr val="000000"/>
+                </a:solidFill>
+                <a:latin typeface="Consolas" panose="020B0609020204030204" pitchFamily="49" charset="0"/>
+              </a:rPr>
+              <a:t>	</a:t>
+            </a:r>
+            <a:r>
+              <a:rPr lang="nn-NO" sz="1800" dirty="0">
+                <a:solidFill>
+                  <a:srgbClr val="0000FF"/>
+                </a:solidFill>
+                <a:latin typeface="Consolas" panose="020B0609020204030204" pitchFamily="49" charset="0"/>
+              </a:rPr>
+              <a:t>for</a:t>
+            </a:r>
+            <a:r>
+              <a:rPr lang="nn-NO" sz="1800" dirty="0">
+                <a:solidFill>
+                  <a:srgbClr val="000000"/>
+                </a:solidFill>
+                <a:latin typeface="Consolas" panose="020B0609020204030204" pitchFamily="49" charset="0"/>
+              </a:rPr>
+              <a:t>(</a:t>
+            </a:r>
+            <a:r>
+              <a:rPr lang="nn-NO" sz="1800" dirty="0">
+                <a:solidFill>
+                  <a:srgbClr val="0000FF"/>
+                </a:solidFill>
+                <a:latin typeface="Consolas" panose="020B0609020204030204" pitchFamily="49" charset="0"/>
+              </a:rPr>
+              <a:t>int</a:t>
+            </a:r>
+            <a:r>
+              <a:rPr lang="nn-NO" sz="1800" dirty="0">
+                <a:solidFill>
+                  <a:srgbClr val="000000"/>
+                </a:solidFill>
+                <a:latin typeface="Consolas" panose="020B0609020204030204" pitchFamily="49" charset="0"/>
+              </a:rPr>
+              <a:t> i = 0; i &lt; 10; i++)</a:t>
+            </a:r>
+          </a:p>
+          <a:p>
+            <a:pPr marL="0" indent="0">
+              <a:buNone/>
+            </a:pPr>
+            <a:r>
+              <a:rPr lang="en-US" sz="1800" dirty="0">
+                <a:solidFill>
+                  <a:srgbClr val="000000"/>
+                </a:solidFill>
+                <a:latin typeface="Consolas" panose="020B0609020204030204" pitchFamily="49" charset="0"/>
+              </a:rPr>
+              <a:t>	{</a:t>
+            </a:r>
+          </a:p>
+          <a:p>
+            <a:pPr marL="0" indent="0">
+              <a:buNone/>
+            </a:pPr>
+            <a:r>
+              <a:rPr lang="en-US" sz="1800" dirty="0">
+                <a:solidFill>
+                  <a:srgbClr val="000000"/>
+                </a:solidFill>
+                <a:latin typeface="Consolas" panose="020B0609020204030204" pitchFamily="49" charset="0"/>
+              </a:rPr>
+              <a:t>            Vector3 </a:t>
+            </a:r>
+            <a:r>
+              <a:rPr lang="en-US" sz="1800" dirty="0" err="1">
+                <a:solidFill>
+                  <a:srgbClr val="000000"/>
+                </a:solidFill>
+                <a:latin typeface="Consolas" panose="020B0609020204030204" pitchFamily="49" charset="0"/>
+              </a:rPr>
+              <a:t>modifiedPosition</a:t>
+            </a:r>
+            <a:r>
+              <a:rPr lang="en-US" sz="1800" dirty="0">
+                <a:solidFill>
+                  <a:srgbClr val="000000"/>
+                </a:solidFill>
+                <a:latin typeface="Consolas" panose="020B0609020204030204" pitchFamily="49" charset="0"/>
+              </a:rPr>
+              <a:t> = </a:t>
+            </a:r>
+            <a:r>
+              <a:rPr lang="en-US" sz="1800" dirty="0">
+                <a:solidFill>
+                  <a:srgbClr val="0000FF"/>
+                </a:solidFill>
+                <a:latin typeface="Consolas" panose="020B0609020204030204" pitchFamily="49" charset="0"/>
+              </a:rPr>
+              <a:t>new</a:t>
+            </a:r>
+            <a:r>
+              <a:rPr lang="en-US" sz="1800" dirty="0">
+                <a:solidFill>
+                  <a:srgbClr val="000000"/>
+                </a:solidFill>
+                <a:latin typeface="Consolas" panose="020B0609020204030204" pitchFamily="49" charset="0"/>
+              </a:rPr>
+              <a:t> Vector3(</a:t>
+            </a:r>
+          </a:p>
+          <a:p>
+            <a:pPr marL="0" indent="0">
+              <a:buNone/>
+            </a:pPr>
+            <a:r>
+              <a:rPr lang="en-US" sz="1800" dirty="0">
+                <a:solidFill>
+                  <a:srgbClr val="000000"/>
+                </a:solidFill>
+                <a:latin typeface="Consolas" panose="020B0609020204030204" pitchFamily="49" charset="0"/>
+              </a:rPr>
+              <a:t>			</a:t>
+            </a:r>
+            <a:r>
+              <a:rPr lang="en-US" sz="1800" dirty="0" err="1">
+                <a:solidFill>
+                  <a:srgbClr val="000000"/>
+                </a:solidFill>
+                <a:latin typeface="Consolas" panose="020B0609020204030204" pitchFamily="49" charset="0"/>
+              </a:rPr>
+              <a:t>Random.Range</a:t>
+            </a:r>
+            <a:r>
+              <a:rPr lang="en-US" sz="1800" dirty="0">
+                <a:solidFill>
+                  <a:srgbClr val="000000"/>
+                </a:solidFill>
+                <a:latin typeface="Consolas" panose="020B0609020204030204" pitchFamily="49" charset="0"/>
+              </a:rPr>
+              <a:t>(</a:t>
+            </a:r>
+            <a:r>
+              <a:rPr lang="en-US" sz="1800" dirty="0" err="1">
+                <a:solidFill>
+                  <a:srgbClr val="000000"/>
+                </a:solidFill>
+                <a:latin typeface="Consolas" panose="020B0609020204030204" pitchFamily="49" charset="0"/>
+              </a:rPr>
+              <a:t>origin.x</a:t>
+            </a:r>
+            <a:r>
+              <a:rPr lang="en-US" sz="1800" dirty="0">
+                <a:solidFill>
+                  <a:srgbClr val="000000"/>
+                </a:solidFill>
+                <a:latin typeface="Consolas" panose="020B0609020204030204" pitchFamily="49" charset="0"/>
+              </a:rPr>
+              <a:t> - 4, </a:t>
+            </a:r>
+            <a:r>
+              <a:rPr lang="en-US" sz="1800" dirty="0" err="1">
+                <a:solidFill>
+                  <a:srgbClr val="000000"/>
+                </a:solidFill>
+                <a:latin typeface="Consolas" panose="020B0609020204030204" pitchFamily="49" charset="0"/>
+              </a:rPr>
+              <a:t>origin.x</a:t>
+            </a:r>
+            <a:r>
+              <a:rPr lang="en-US" sz="1800" dirty="0">
+                <a:solidFill>
+                  <a:srgbClr val="000000"/>
+                </a:solidFill>
+                <a:latin typeface="Consolas" panose="020B0609020204030204" pitchFamily="49" charset="0"/>
+              </a:rPr>
+              <a:t> + 4),</a:t>
+            </a:r>
+          </a:p>
+          <a:p>
+            <a:pPr marL="0" indent="0">
+              <a:buNone/>
+            </a:pPr>
+            <a:r>
+              <a:rPr lang="en-US" sz="1800" dirty="0">
+                <a:solidFill>
+                  <a:srgbClr val="000000"/>
+                </a:solidFill>
+                <a:latin typeface="Consolas" panose="020B0609020204030204" pitchFamily="49" charset="0"/>
+              </a:rPr>
+              <a:t>			</a:t>
+            </a:r>
+            <a:r>
+              <a:rPr lang="en-US" sz="1800" dirty="0" err="1">
+                <a:solidFill>
+                  <a:srgbClr val="000000"/>
+                </a:solidFill>
+                <a:latin typeface="Consolas" panose="020B0609020204030204" pitchFamily="49" charset="0"/>
+              </a:rPr>
+              <a:t>Random.Range</a:t>
+            </a:r>
+            <a:r>
+              <a:rPr lang="en-US" sz="1800" dirty="0">
+                <a:solidFill>
+                  <a:srgbClr val="000000"/>
+                </a:solidFill>
+                <a:latin typeface="Consolas" panose="020B0609020204030204" pitchFamily="49" charset="0"/>
+              </a:rPr>
+              <a:t>(</a:t>
+            </a:r>
+            <a:r>
+              <a:rPr lang="en-US" sz="1800" dirty="0" err="1">
+                <a:solidFill>
+                  <a:srgbClr val="000000"/>
+                </a:solidFill>
+                <a:latin typeface="Consolas" panose="020B0609020204030204" pitchFamily="49" charset="0"/>
+              </a:rPr>
+              <a:t>origin.y</a:t>
+            </a:r>
+            <a:r>
+              <a:rPr lang="en-US" sz="1800" dirty="0">
+                <a:solidFill>
+                  <a:srgbClr val="000000"/>
+                </a:solidFill>
+                <a:latin typeface="Consolas" panose="020B0609020204030204" pitchFamily="49" charset="0"/>
+              </a:rPr>
+              <a:t> - 4, </a:t>
+            </a:r>
+            <a:r>
+              <a:rPr lang="en-US" sz="1800" dirty="0" err="1">
+                <a:solidFill>
+                  <a:srgbClr val="000000"/>
+                </a:solidFill>
+                <a:latin typeface="Consolas" panose="020B0609020204030204" pitchFamily="49" charset="0"/>
+              </a:rPr>
+              <a:t>origin.y</a:t>
+            </a:r>
+            <a:r>
+              <a:rPr lang="en-US" sz="1800" dirty="0">
+                <a:solidFill>
+                  <a:srgbClr val="000000"/>
+                </a:solidFill>
+                <a:latin typeface="Consolas" panose="020B0609020204030204" pitchFamily="49" charset="0"/>
+              </a:rPr>
+              <a:t> + 4),                                                			</a:t>
+            </a:r>
+            <a:r>
+              <a:rPr lang="en-US" sz="1800" dirty="0" err="1">
+                <a:solidFill>
+                  <a:srgbClr val="000000"/>
+                </a:solidFill>
+                <a:latin typeface="Consolas" panose="020B0609020204030204" pitchFamily="49" charset="0"/>
+              </a:rPr>
+              <a:t>Random.Range</a:t>
+            </a:r>
+            <a:r>
+              <a:rPr lang="en-US" sz="1800" dirty="0">
+                <a:solidFill>
+                  <a:srgbClr val="000000"/>
+                </a:solidFill>
+                <a:latin typeface="Consolas" panose="020B0609020204030204" pitchFamily="49" charset="0"/>
+              </a:rPr>
+              <a:t>(</a:t>
+            </a:r>
+            <a:r>
+              <a:rPr lang="en-US" sz="1800" dirty="0" err="1">
+                <a:solidFill>
+                  <a:srgbClr val="000000"/>
+                </a:solidFill>
+                <a:latin typeface="Consolas" panose="020B0609020204030204" pitchFamily="49" charset="0"/>
+              </a:rPr>
+              <a:t>origin.z</a:t>
+            </a:r>
+            <a:r>
+              <a:rPr lang="en-US" sz="1800" dirty="0">
+                <a:solidFill>
+                  <a:srgbClr val="000000"/>
+                </a:solidFill>
+                <a:latin typeface="Consolas" panose="020B0609020204030204" pitchFamily="49" charset="0"/>
+              </a:rPr>
+              <a:t> - 4, </a:t>
+            </a:r>
+            <a:r>
+              <a:rPr lang="en-US" sz="1800" dirty="0" err="1">
+                <a:solidFill>
+                  <a:srgbClr val="000000"/>
+                </a:solidFill>
+                <a:latin typeface="Consolas" panose="020B0609020204030204" pitchFamily="49" charset="0"/>
+              </a:rPr>
+              <a:t>origin.z</a:t>
+            </a:r>
+            <a:r>
+              <a:rPr lang="en-US" sz="1800" dirty="0">
+                <a:solidFill>
+                  <a:srgbClr val="000000"/>
+                </a:solidFill>
+                <a:latin typeface="Consolas" panose="020B0609020204030204" pitchFamily="49" charset="0"/>
+              </a:rPr>
+              <a:t> + 4));</a:t>
+            </a:r>
+          </a:p>
+          <a:p>
+            <a:pPr marL="0" indent="0">
+              <a:buNone/>
+            </a:pPr>
+            <a:r>
+              <a:rPr lang="en-US" sz="1800" dirty="0">
+                <a:solidFill>
+                  <a:srgbClr val="000000"/>
+                </a:solidFill>
+                <a:latin typeface="Consolas" panose="020B0609020204030204" pitchFamily="49" charset="0"/>
+              </a:rPr>
+              <a:t>            </a:t>
+            </a:r>
+            <a:r>
+              <a:rPr lang="en-US" sz="1800" dirty="0" err="1">
+                <a:solidFill>
+                  <a:srgbClr val="000000"/>
+                </a:solidFill>
+                <a:latin typeface="Consolas" panose="020B0609020204030204" pitchFamily="49" charset="0"/>
+              </a:rPr>
+              <a:t>transform.position</a:t>
+            </a:r>
+            <a:r>
+              <a:rPr lang="en-US" sz="1800" dirty="0">
+                <a:solidFill>
+                  <a:srgbClr val="000000"/>
+                </a:solidFill>
+                <a:latin typeface="Consolas" panose="020B0609020204030204" pitchFamily="49" charset="0"/>
+              </a:rPr>
+              <a:t> = </a:t>
+            </a:r>
+            <a:r>
+              <a:rPr lang="en-US" sz="1800" dirty="0" err="1">
+                <a:solidFill>
+                  <a:srgbClr val="000000"/>
+                </a:solidFill>
+                <a:latin typeface="Consolas" panose="020B0609020204030204" pitchFamily="49" charset="0"/>
+              </a:rPr>
+              <a:t>modifiedPosition</a:t>
+            </a:r>
+            <a:r>
+              <a:rPr lang="en-US" sz="1800" dirty="0">
+                <a:solidFill>
+                  <a:srgbClr val="000000"/>
+                </a:solidFill>
+                <a:latin typeface="Consolas" panose="020B0609020204030204" pitchFamily="49" charset="0"/>
+              </a:rPr>
+              <a:t>;</a:t>
+            </a:r>
+          </a:p>
+          <a:p>
+            <a:pPr marL="0" indent="0">
+              <a:buNone/>
+            </a:pPr>
+            <a:r>
+              <a:rPr lang="en-AU" sz="1800" dirty="0">
+                <a:solidFill>
+                  <a:srgbClr val="000000"/>
+                </a:solidFill>
+                <a:latin typeface="Consolas" panose="020B0609020204030204" pitchFamily="49" charset="0"/>
+              </a:rPr>
+              <a:t>            </a:t>
+            </a:r>
+            <a:r>
+              <a:rPr lang="en-AU" sz="1800" dirty="0">
+                <a:solidFill>
+                  <a:srgbClr val="0000FF"/>
+                </a:solidFill>
+                <a:latin typeface="Consolas" panose="020B0609020204030204" pitchFamily="49" charset="0"/>
+              </a:rPr>
+              <a:t>yield</a:t>
+            </a:r>
+            <a:r>
+              <a:rPr lang="en-AU" sz="1800" dirty="0">
+                <a:solidFill>
+                  <a:srgbClr val="000000"/>
+                </a:solidFill>
+                <a:latin typeface="Consolas" panose="020B0609020204030204" pitchFamily="49" charset="0"/>
+              </a:rPr>
+              <a:t> </a:t>
+            </a:r>
+            <a:r>
+              <a:rPr lang="en-AU" sz="1800" dirty="0">
+                <a:solidFill>
+                  <a:srgbClr val="0000FF"/>
+                </a:solidFill>
+                <a:latin typeface="Consolas" panose="020B0609020204030204" pitchFamily="49" charset="0"/>
+              </a:rPr>
+              <a:t>return</a:t>
+            </a:r>
+            <a:r>
+              <a:rPr lang="en-AU" sz="1800" dirty="0">
+                <a:solidFill>
+                  <a:srgbClr val="000000"/>
+                </a:solidFill>
+                <a:latin typeface="Consolas" panose="020B0609020204030204" pitchFamily="49" charset="0"/>
+              </a:rPr>
+              <a:t> </a:t>
+            </a:r>
+            <a:r>
+              <a:rPr lang="en-AU" sz="1800" dirty="0">
+                <a:solidFill>
+                  <a:srgbClr val="0000FF"/>
+                </a:solidFill>
+                <a:latin typeface="Consolas" panose="020B0609020204030204" pitchFamily="49" charset="0"/>
+              </a:rPr>
+              <a:t>new</a:t>
+            </a:r>
+            <a:r>
+              <a:rPr lang="en-AU" sz="1800" dirty="0">
+                <a:solidFill>
+                  <a:srgbClr val="000000"/>
+                </a:solidFill>
+                <a:latin typeface="Consolas" panose="020B0609020204030204" pitchFamily="49" charset="0"/>
+              </a:rPr>
+              <a:t> </a:t>
+            </a:r>
+            <a:r>
+              <a:rPr lang="en-AU" sz="1800" dirty="0" err="1">
+                <a:solidFill>
+                  <a:srgbClr val="000000"/>
+                </a:solidFill>
+                <a:latin typeface="Consolas" panose="020B0609020204030204" pitchFamily="49" charset="0"/>
+              </a:rPr>
+              <a:t>WaitForSeconds</a:t>
+            </a:r>
+            <a:r>
+              <a:rPr lang="en-AU" sz="1800" dirty="0">
+                <a:solidFill>
+                  <a:srgbClr val="000000"/>
+                </a:solidFill>
+                <a:latin typeface="Consolas" panose="020B0609020204030204" pitchFamily="49" charset="0"/>
+              </a:rPr>
+              <a:t>(1f);</a:t>
+            </a:r>
+          </a:p>
+          <a:p>
+            <a:pPr marL="0" indent="0">
+              <a:buNone/>
+            </a:pPr>
+            <a:r>
+              <a:rPr lang="en-US" sz="1800" dirty="0">
+                <a:solidFill>
+                  <a:srgbClr val="000000"/>
+                </a:solidFill>
+                <a:latin typeface="Consolas" panose="020B0609020204030204" pitchFamily="49" charset="0"/>
+              </a:rPr>
+              <a:t>        }</a:t>
+            </a:r>
+          </a:p>
+          <a:p>
+            <a:pPr marL="0" indent="0">
+              <a:buNone/>
+            </a:pPr>
+            <a:r>
+              <a:rPr lang="en-US" sz="1800" dirty="0">
+                <a:solidFill>
+                  <a:srgbClr val="000000"/>
+                </a:solidFill>
+                <a:latin typeface="Consolas" panose="020B0609020204030204" pitchFamily="49" charset="0"/>
+              </a:rPr>
+              <a:t>        </a:t>
+            </a:r>
+            <a:r>
+              <a:rPr lang="en-US" sz="1800" dirty="0" err="1">
+                <a:solidFill>
+                  <a:srgbClr val="000000"/>
+                </a:solidFill>
+                <a:latin typeface="Consolas" panose="020B0609020204030204" pitchFamily="49" charset="0"/>
+              </a:rPr>
+              <a:t>transform.position</a:t>
+            </a:r>
+            <a:r>
+              <a:rPr lang="en-US" sz="1800" dirty="0">
+                <a:solidFill>
+                  <a:srgbClr val="000000"/>
+                </a:solidFill>
+                <a:latin typeface="Consolas" panose="020B0609020204030204" pitchFamily="49" charset="0"/>
+              </a:rPr>
+              <a:t> = origin;   </a:t>
+            </a:r>
+          </a:p>
+          <a:p>
+            <a:pPr marL="0" indent="0">
+              <a:buNone/>
+            </a:pPr>
+            <a:r>
+              <a:rPr lang="en-US" sz="1800" dirty="0">
+                <a:solidFill>
+                  <a:srgbClr val="000000"/>
+                </a:solidFill>
+                <a:latin typeface="Consolas" panose="020B0609020204030204" pitchFamily="49" charset="0"/>
+              </a:rPr>
+              <a:t>}</a:t>
+            </a:r>
             <a:endParaRPr lang="en-AU" altLang="en-US" dirty="0"/>
           </a:p>
         </p:txBody>
@@ -12246,6 +12967,307 @@
 </file>
 
 <file path=ppt/slides/slide4.xml><?xml version="1.0" encoding="utf-8"?>
+<p:sld xmlns:a="http://schemas.openxmlformats.org/drawingml/2006/main" xmlns:r="http://schemas.openxmlformats.org/officeDocument/2006/relationships" xmlns:p="http://schemas.openxmlformats.org/presentationml/2006/main">
+  <p:cSld>
+    <p:spTree>
+      <p:nvGrpSpPr>
+        <p:cNvPr id="1" name=""/>
+        <p:cNvGrpSpPr/>
+        <p:nvPr/>
+      </p:nvGrpSpPr>
+      <p:grpSpPr>
+        <a:xfrm>
+          <a:off x="0" y="0"/>
+          <a:ext cx="0" cy="0"/>
+          <a:chOff x="0" y="0"/>
+          <a:chExt cx="0" cy="0"/>
+        </a:xfrm>
+      </p:grpSpPr>
+      <p:sp>
+        <p:nvSpPr>
+          <p:cNvPr id="2" name="Content Placeholder 1">
+            <a:extLst>
+              <a:ext uri="{FF2B5EF4-FFF2-40B4-BE49-F238E27FC236}">
+                <a16:creationId xmlns:a16="http://schemas.microsoft.com/office/drawing/2014/main" id="{73FA9E51-D968-437D-B351-5B36DD7DA5F1}"/>
+              </a:ext>
+            </a:extLst>
+          </p:cNvPr>
+          <p:cNvSpPr>
+            <a:spLocks noGrp="1"/>
+          </p:cNvSpPr>
+          <p:nvPr>
+            <p:ph sz="half" idx="1"/>
+          </p:nvPr>
+        </p:nvSpPr>
+        <p:spPr>
+          <a:xfrm>
+            <a:off x="912284" y="1124747"/>
+            <a:ext cx="10593916" cy="4176463"/>
+          </a:xfrm>
+        </p:spPr>
+        <p:txBody>
+          <a:bodyPr/>
+          <a:lstStyle/>
+          <a:p>
+            <a:pPr marL="0" indent="0">
+              <a:buNone/>
+            </a:pPr>
+            <a:r>
+              <a:rPr lang="en-US" sz="1800" dirty="0">
+                <a:solidFill>
+                  <a:srgbClr val="0000FF"/>
+                </a:solidFill>
+                <a:latin typeface="Consolas" panose="020B0609020204030204" pitchFamily="49" charset="0"/>
+              </a:rPr>
+              <a:t>void</a:t>
+            </a:r>
+            <a:r>
+              <a:rPr lang="en-US" sz="1800" dirty="0">
+                <a:solidFill>
+                  <a:srgbClr val="000000"/>
+                </a:solidFill>
+                <a:latin typeface="Consolas" panose="020B0609020204030204" pitchFamily="49" charset="0"/>
+              </a:rPr>
+              <a:t> </a:t>
+            </a:r>
+            <a:r>
+              <a:rPr lang="en-US" sz="1800" dirty="0">
+                <a:solidFill>
+                  <a:srgbClr val="0000FF"/>
+                </a:solidFill>
+                <a:latin typeface="Consolas" panose="020B0609020204030204" pitchFamily="49" charset="0"/>
+              </a:rPr>
+              <a:t>Update</a:t>
+            </a:r>
+            <a:r>
+              <a:rPr lang="en-US" sz="1800" dirty="0">
+                <a:solidFill>
+                  <a:srgbClr val="000000"/>
+                </a:solidFill>
+                <a:latin typeface="Consolas" panose="020B0609020204030204" pitchFamily="49" charset="0"/>
+              </a:rPr>
+              <a:t>()</a:t>
+            </a:r>
+          </a:p>
+          <a:p>
+            <a:pPr marL="0" indent="0">
+              <a:buNone/>
+            </a:pPr>
+            <a:r>
+              <a:rPr lang="en-US" sz="1800" dirty="0">
+                <a:solidFill>
+                  <a:srgbClr val="000000"/>
+                </a:solidFill>
+                <a:latin typeface="Consolas" panose="020B0609020204030204" pitchFamily="49" charset="0"/>
+              </a:rPr>
+              <a:t>{</a:t>
+            </a:r>
+          </a:p>
+          <a:p>
+            <a:pPr marL="0" indent="0">
+              <a:buNone/>
+            </a:pPr>
+            <a:r>
+              <a:rPr lang="en-AU" sz="1800" dirty="0">
+                <a:solidFill>
+                  <a:srgbClr val="000000"/>
+                </a:solidFill>
+                <a:latin typeface="Consolas" panose="020B0609020204030204" pitchFamily="49" charset="0"/>
+              </a:rPr>
+              <a:t>        </a:t>
+            </a:r>
+            <a:r>
+              <a:rPr lang="en-AU" sz="1800" dirty="0">
+                <a:solidFill>
+                  <a:srgbClr val="0000FF"/>
+                </a:solidFill>
+                <a:latin typeface="Consolas" panose="020B0609020204030204" pitchFamily="49" charset="0"/>
+              </a:rPr>
+              <a:t>if</a:t>
+            </a:r>
+            <a:r>
+              <a:rPr lang="en-AU" sz="1800" dirty="0">
+                <a:solidFill>
+                  <a:srgbClr val="000000"/>
+                </a:solidFill>
+                <a:latin typeface="Consolas" panose="020B0609020204030204" pitchFamily="49" charset="0"/>
+              </a:rPr>
+              <a:t>(</a:t>
+            </a:r>
+            <a:r>
+              <a:rPr lang="en-AU" sz="1800" dirty="0" err="1">
+                <a:solidFill>
+                  <a:srgbClr val="000000"/>
+                </a:solidFill>
+                <a:latin typeface="Consolas" panose="020B0609020204030204" pitchFamily="49" charset="0"/>
+              </a:rPr>
+              <a:t>Input.GetKeyDown</a:t>
+            </a:r>
+            <a:r>
+              <a:rPr lang="en-AU" sz="1800" dirty="0">
+                <a:solidFill>
+                  <a:srgbClr val="000000"/>
+                </a:solidFill>
+                <a:latin typeface="Consolas" panose="020B0609020204030204" pitchFamily="49" charset="0"/>
+              </a:rPr>
+              <a:t>(</a:t>
+            </a:r>
+            <a:r>
+              <a:rPr lang="en-AU" sz="1800" dirty="0" err="1">
+                <a:solidFill>
+                  <a:srgbClr val="000000"/>
+                </a:solidFill>
+                <a:latin typeface="Consolas" panose="020B0609020204030204" pitchFamily="49" charset="0"/>
+              </a:rPr>
+              <a:t>KeyCode.Space</a:t>
+            </a:r>
+            <a:r>
+              <a:rPr lang="en-AU" sz="1800" dirty="0">
+                <a:solidFill>
+                  <a:srgbClr val="000000"/>
+                </a:solidFill>
+                <a:latin typeface="Consolas" panose="020B0609020204030204" pitchFamily="49" charset="0"/>
+              </a:rPr>
+              <a:t>))</a:t>
+            </a:r>
+          </a:p>
+          <a:p>
+            <a:pPr marL="0" indent="0">
+              <a:buNone/>
+            </a:pPr>
+            <a:r>
+              <a:rPr lang="en-US" sz="1800" dirty="0">
+                <a:solidFill>
+                  <a:srgbClr val="000000"/>
+                </a:solidFill>
+                <a:latin typeface="Consolas" panose="020B0609020204030204" pitchFamily="49" charset="0"/>
+              </a:rPr>
+              <a:t>        {</a:t>
+            </a:r>
+          </a:p>
+          <a:p>
+            <a:pPr marL="0" indent="0">
+              <a:buNone/>
+            </a:pPr>
+            <a:r>
+              <a:rPr lang="en-US" sz="1800" dirty="0">
+                <a:solidFill>
+                  <a:srgbClr val="000000"/>
+                </a:solidFill>
+                <a:latin typeface="Consolas" panose="020B0609020204030204" pitchFamily="49" charset="0"/>
+              </a:rPr>
+              <a:t>            </a:t>
+            </a:r>
+            <a:r>
+              <a:rPr lang="en-US" sz="1800" dirty="0" err="1">
+                <a:solidFill>
+                  <a:srgbClr val="000000"/>
+                </a:solidFill>
+                <a:latin typeface="Consolas" panose="020B0609020204030204" pitchFamily="49" charset="0"/>
+              </a:rPr>
+              <a:t>StartCoroutine</a:t>
+            </a:r>
+            <a:r>
+              <a:rPr lang="en-US" sz="1800" dirty="0">
+                <a:solidFill>
+                  <a:srgbClr val="000000"/>
+                </a:solidFill>
+                <a:latin typeface="Consolas" panose="020B0609020204030204" pitchFamily="49" charset="0"/>
+              </a:rPr>
+              <a:t>(</a:t>
+            </a:r>
+            <a:r>
+              <a:rPr lang="en-US" sz="1800" dirty="0" err="1">
+                <a:solidFill>
+                  <a:srgbClr val="000000"/>
+                </a:solidFill>
+                <a:latin typeface="Consolas" panose="020B0609020204030204" pitchFamily="49" charset="0"/>
+              </a:rPr>
+              <a:t>movePlaces</a:t>
+            </a:r>
+            <a:r>
+              <a:rPr lang="en-US" sz="1800" dirty="0">
+                <a:solidFill>
+                  <a:srgbClr val="000000"/>
+                </a:solidFill>
+                <a:latin typeface="Consolas" panose="020B0609020204030204" pitchFamily="49" charset="0"/>
+              </a:rPr>
+              <a:t>());</a:t>
+            </a:r>
+          </a:p>
+          <a:p>
+            <a:pPr marL="0" indent="0">
+              <a:buNone/>
+            </a:pPr>
+            <a:r>
+              <a:rPr lang="en-US" sz="1800" dirty="0">
+                <a:solidFill>
+                  <a:srgbClr val="000000"/>
+                </a:solidFill>
+                <a:latin typeface="Consolas" panose="020B0609020204030204" pitchFamily="49" charset="0"/>
+              </a:rPr>
+              <a:t>        }</a:t>
+            </a:r>
+          </a:p>
+          <a:p>
+            <a:pPr marL="0" indent="0">
+              <a:buNone/>
+            </a:pPr>
+            <a:r>
+              <a:rPr lang="en-US" sz="1800" dirty="0">
+                <a:solidFill>
+                  <a:srgbClr val="000000"/>
+                </a:solidFill>
+                <a:latin typeface="Consolas" panose="020B0609020204030204" pitchFamily="49" charset="0"/>
+              </a:rPr>
+              <a:t>}</a:t>
+            </a:r>
+            <a:endParaRPr lang="en-US" dirty="0"/>
+          </a:p>
+        </p:txBody>
+      </p:sp>
+      <p:sp>
+        <p:nvSpPr>
+          <p:cNvPr id="4" name="Title 3">
+            <a:extLst>
+              <a:ext uri="{FF2B5EF4-FFF2-40B4-BE49-F238E27FC236}">
+                <a16:creationId xmlns:a16="http://schemas.microsoft.com/office/drawing/2014/main" id="{D1759E5F-ED71-4626-B518-4B2884FDC5D9}"/>
+              </a:ext>
+            </a:extLst>
+          </p:cNvPr>
+          <p:cNvSpPr>
+            <a:spLocks noGrp="1"/>
+          </p:cNvSpPr>
+          <p:nvPr>
+            <p:ph type="title"/>
+          </p:nvPr>
+        </p:nvSpPr>
+        <p:spPr/>
+        <p:txBody>
+          <a:bodyPr/>
+          <a:lstStyle/>
+          <a:p>
+            <a:r>
+              <a:rPr lang="en-US" dirty="0"/>
+              <a:t>Coroutines</a:t>
+            </a:r>
+          </a:p>
+        </p:txBody>
+      </p:sp>
+    </p:spTree>
+    <p:extLst>
+      <p:ext uri="{BB962C8B-B14F-4D97-AF65-F5344CB8AC3E}">
+        <p14:creationId xmlns:p14="http://schemas.microsoft.com/office/powerpoint/2010/main" val="2887586209"/>
+      </p:ext>
+    </p:extLst>
+  </p:cSld>
+  <p:clrMapOvr>
+    <a:masterClrMapping/>
+  </p:clrMapOvr>
+</p:sld>
+</file>
+
+<file path=ppt/slides/slide5.xml><?xml version="1.0" encoding="utf-8"?>
 <p:sld xmlns:a="http://schemas.openxmlformats.org/drawingml/2006/main" xmlns:r="http://schemas.openxmlformats.org/officeDocument/2006/relationships" xmlns:p="http://schemas.openxmlformats.org/presentationml/2006/main">
   <p:cSld>
     <p:spTree>
@@ -12773,114 +13795,6 @@
 </p:sld>
 </file>
 
-<file path=ppt/slides/slide5.xml><?xml version="1.0" encoding="utf-8"?>
-<p:sld xmlns:a="http://schemas.openxmlformats.org/drawingml/2006/main" xmlns:r="http://schemas.openxmlformats.org/officeDocument/2006/relationships" xmlns:p="http://schemas.openxmlformats.org/presentationml/2006/main">
-  <p:cSld>
-    <p:spTree>
-      <p:nvGrpSpPr>
-        <p:cNvPr id="1" name=""/>
-        <p:cNvGrpSpPr/>
-        <p:nvPr/>
-      </p:nvGrpSpPr>
-      <p:grpSpPr>
-        <a:xfrm>
-          <a:off x="0" y="0"/>
-          <a:ext cx="0" cy="0"/>
-          <a:chOff x="0" y="0"/>
-          <a:chExt cx="0" cy="0"/>
-        </a:xfrm>
-      </p:grpSpPr>
-      <p:sp>
-        <p:nvSpPr>
-          <p:cNvPr id="19458" name="Title 1"/>
-          <p:cNvSpPr>
-            <a:spLocks noGrp="1"/>
-          </p:cNvSpPr>
-          <p:nvPr>
-            <p:ph type="title"/>
-          </p:nvPr>
-        </p:nvSpPr>
-        <p:spPr/>
-        <p:txBody>
-          <a:bodyPr/>
-          <a:lstStyle/>
-          <a:p>
-            <a:r>
-              <a:rPr lang="en-US" altLang="en-US" dirty="0"/>
-              <a:t>Game Design Patterns</a:t>
-            </a:r>
-            <a:endParaRPr lang="en-AU" altLang="en-US" dirty="0"/>
-          </a:p>
-        </p:txBody>
-      </p:sp>
-      <p:sp>
-        <p:nvSpPr>
-          <p:cNvPr id="19459" name="Subtitle 2"/>
-          <p:cNvSpPr>
-            <a:spLocks noGrp="1"/>
-          </p:cNvSpPr>
-          <p:nvPr>
-            <p:ph idx="1"/>
-          </p:nvPr>
-        </p:nvSpPr>
-        <p:spPr/>
-        <p:txBody>
-          <a:bodyPr/>
-          <a:lstStyle/>
-          <a:p>
-            <a:r>
-              <a:rPr lang="en-AU" altLang="en-US" dirty="0"/>
-              <a:t>Singleton Pattern</a:t>
-            </a:r>
-          </a:p>
-          <a:p>
-            <a:r>
-              <a:rPr lang="en-AU" altLang="en-US" dirty="0"/>
-              <a:t>Observer Pattern</a:t>
-            </a:r>
-          </a:p>
-          <a:p>
-            <a:r>
-              <a:rPr lang="en-AU" altLang="en-US" dirty="0"/>
-              <a:t>Command Pattern</a:t>
-            </a:r>
-          </a:p>
-          <a:p>
-            <a:r>
-              <a:rPr lang="en-AU" altLang="en-US" dirty="0"/>
-              <a:t>Component Pattern</a:t>
-            </a:r>
-          </a:p>
-          <a:p>
-            <a:r>
-              <a:rPr lang="en-AU" altLang="en-US" dirty="0"/>
-              <a:t>Flyweight Pattern</a:t>
-            </a:r>
-          </a:p>
-          <a:p>
-            <a:r>
-              <a:rPr lang="en-AU" altLang="en-US" dirty="0"/>
-              <a:t>State Pattern</a:t>
-            </a:r>
-          </a:p>
-        </p:txBody>
-      </p:sp>
-    </p:spTree>
-    <p:custDataLst>
-      <p:tags r:id="rId1"/>
-    </p:custDataLst>
-    <p:extLst>
-      <p:ext uri="{BB962C8B-B14F-4D97-AF65-F5344CB8AC3E}">
-        <p14:creationId xmlns:p14="http://schemas.microsoft.com/office/powerpoint/2010/main" val="3590375924"/>
-      </p:ext>
-    </p:extLst>
-  </p:cSld>
-  <p:clrMapOvr>
-    <a:masterClrMapping/>
-  </p:clrMapOvr>
-</p:sld>
-</file>
-
 <file path=ppt/slides/slide6.xml><?xml version="1.0" encoding="utf-8"?>
 <p:sld xmlns:a="http://schemas.openxmlformats.org/drawingml/2006/main" xmlns:r="http://schemas.openxmlformats.org/officeDocument/2006/relationships" xmlns:p="http://schemas.openxmlformats.org/presentationml/2006/main">
   <p:cSld>
@@ -12915,7 +13829,7 @@
           <a:p>
             <a:r>
               <a:rPr lang="en-US" altLang="en-US" dirty="0"/>
-              <a:t>SOLID Principles in Unity</a:t>
+              <a:t>Game Design Patterns</a:t>
             </a:r>
             <a:endParaRPr lang="en-AU" altLang="en-US" dirty="0"/>
           </a:p>
@@ -12938,55 +13852,37 @@
           <a:p>
             <a:r>
               <a:rPr lang="en-AU" altLang="en-US" dirty="0"/>
-              <a:t>[S]ingle Responsibility Principle</a:t>
+              <a:t>Singleton Pattern</a:t>
             </a:r>
           </a:p>
           <a:p>
             <a:r>
               <a:rPr lang="en-AU" altLang="en-US" dirty="0"/>
-              <a:t>[O]pen Closed Principle</a:t>
+              <a:t>Observer Pattern</a:t>
             </a:r>
           </a:p>
           <a:p>
             <a:r>
               <a:rPr lang="en-AU" altLang="en-US" dirty="0"/>
-              <a:t>[L]</a:t>
-            </a:r>
-            <a:r>
-              <a:rPr lang="en-AU" altLang="en-US" dirty="0" err="1"/>
-              <a:t>iskov</a:t>
-            </a:r>
+              <a:t>Command Pattern</a:t>
+            </a:r>
+          </a:p>
+          <a:p>
             <a:r>
               <a:rPr lang="en-AU" altLang="en-US" dirty="0"/>
-              <a:t> Substitution Principle</a:t>
+              <a:t>Component Pattern</a:t>
             </a:r>
           </a:p>
           <a:p>
             <a:r>
               <a:rPr lang="en-AU" altLang="en-US" dirty="0"/>
-              <a:t>[I]</a:t>
-            </a:r>
-            <a:r>
-              <a:rPr lang="en-AU" altLang="en-US" dirty="0" err="1"/>
-              <a:t>nterface</a:t>
-            </a:r>
+              <a:t>Flyweight Pattern</a:t>
+            </a:r>
+          </a:p>
+          <a:p>
             <a:r>
               <a:rPr lang="en-AU" altLang="en-US" dirty="0"/>
-              <a:t> Segregation Principle</a:t>
-            </a:r>
-          </a:p>
-          <a:p>
-            <a:r>
-              <a:rPr lang="en-AU" altLang="en-US" dirty="0"/>
-              <a:t>[D]</a:t>
-            </a:r>
-            <a:r>
-              <a:rPr lang="en-AU" altLang="en-US" dirty="0" err="1"/>
-              <a:t>ependency</a:t>
-            </a:r>
-            <a:r>
-              <a:rPr lang="en-AU" altLang="en-US" dirty="0"/>
-              <a:t> Inversion Principle</a:t>
+              <a:t>State Pattern</a:t>
             </a:r>
           </a:p>
         </p:txBody>
@@ -12997,7 +13893,7 @@
     </p:custDataLst>
     <p:extLst>
       <p:ext uri="{BB962C8B-B14F-4D97-AF65-F5344CB8AC3E}">
-        <p14:creationId xmlns:p14="http://schemas.microsoft.com/office/powerpoint/2010/main" val="2133247701"/>
+        <p14:creationId xmlns:p14="http://schemas.microsoft.com/office/powerpoint/2010/main" val="3590375924"/>
       </p:ext>
     </p:extLst>
   </p:cSld>
@@ -13041,7 +13937,7 @@
           <a:p>
             <a:r>
               <a:rPr lang="en-US" altLang="en-US" dirty="0"/>
-              <a:t>Team vs Team</a:t>
+              <a:t>SOLID Principles in Unity</a:t>
             </a:r>
             <a:endParaRPr lang="en-AU" altLang="en-US" dirty="0"/>
           </a:p>
@@ -13057,18 +13953,113 @@
             <p:ph idx="1"/>
           </p:nvPr>
         </p:nvSpPr>
-        <p:spPr/>
+        <p:spPr>
+          <a:xfrm>
+            <a:off x="533400" y="1124746"/>
+            <a:ext cx="11277600" cy="4104455"/>
+          </a:xfrm>
+        </p:spPr>
         <p:txBody>
           <a:bodyPr/>
           <a:lstStyle/>
           <a:p>
+            <a:r>
+              <a:rPr lang="en-AU" altLang="en-US" sz="2200" dirty="0"/>
+              <a:t>[S]ingle Responsibility Principle</a:t>
+            </a:r>
+          </a:p>
+          <a:p>
             <a:pPr marL="0" indent="0">
               <a:buNone/>
             </a:pPr>
-            <a:endParaRPr lang="en-AU" altLang="en-US" dirty="0"/>
-          </a:p>
-          <a:p>
-            <a:endParaRPr lang="en-AU" altLang="en-US" dirty="0"/>
+            <a:r>
+              <a:rPr lang="en-AU" altLang="en-US" sz="2200" dirty="0"/>
+              <a:t>	“Every class should have one responsibility.”</a:t>
+            </a:r>
+          </a:p>
+          <a:p>
+            <a:r>
+              <a:rPr lang="en-AU" altLang="en-US" sz="2200" dirty="0"/>
+              <a:t>[O]pen Closed Principle</a:t>
+            </a:r>
+          </a:p>
+          <a:p>
+            <a:pPr marL="457200" lvl="1" indent="0">
+              <a:buNone/>
+            </a:pPr>
+            <a:r>
+              <a:rPr lang="en-AU" altLang="en-US" sz="2200" dirty="0"/>
+              <a:t>	“Open for extension, but closed for modification.”</a:t>
+            </a:r>
+          </a:p>
+          <a:p>
+            <a:r>
+              <a:rPr lang="en-AU" altLang="en-US" sz="2200" dirty="0"/>
+              <a:t>[L]</a:t>
+            </a:r>
+            <a:r>
+              <a:rPr lang="en-AU" altLang="en-US" sz="2200" dirty="0" err="1"/>
+              <a:t>iskov</a:t>
+            </a:r>
+            <a:r>
+              <a:rPr lang="en-AU" altLang="en-US" sz="2200" dirty="0"/>
+              <a:t> Substitution Principle</a:t>
+            </a:r>
+          </a:p>
+          <a:p>
+            <a:pPr marL="0" indent="0">
+              <a:buNone/>
+            </a:pPr>
+            <a:r>
+              <a:rPr lang="en-AU" altLang="en-US" sz="2200" dirty="0"/>
+              <a:t>	“Functions that use pointers or references to base classes must be able to use 	objects of derived classes without knowing it.”</a:t>
+            </a:r>
+          </a:p>
+          <a:p>
+            <a:r>
+              <a:rPr lang="en-AU" altLang="en-US" sz="2200" dirty="0"/>
+              <a:t>[I]</a:t>
+            </a:r>
+            <a:r>
+              <a:rPr lang="en-AU" altLang="en-US" sz="2200" dirty="0" err="1"/>
+              <a:t>nterface</a:t>
+            </a:r>
+            <a:r>
+              <a:rPr lang="en-AU" altLang="en-US" sz="2200" dirty="0"/>
+              <a:t> Segregation Principle</a:t>
+            </a:r>
+          </a:p>
+          <a:p>
+            <a:pPr marL="0" indent="0">
+              <a:buNone/>
+            </a:pPr>
+            <a:r>
+              <a:rPr lang="en-AU" altLang="en-US" sz="2200" dirty="0"/>
+              <a:t>	“Many client-specific interfaces are better than one general-purpose interface.”</a:t>
+            </a:r>
+          </a:p>
+          <a:p>
+            <a:r>
+              <a:rPr lang="en-AU" altLang="en-US" sz="2200" dirty="0"/>
+              <a:t>[D]</a:t>
+            </a:r>
+            <a:r>
+              <a:rPr lang="en-AU" altLang="en-US" sz="2200" dirty="0" err="1"/>
+              <a:t>ependency</a:t>
+            </a:r>
+            <a:r>
+              <a:rPr lang="en-AU" altLang="en-US" sz="2200" dirty="0"/>
+              <a:t> Inversion Principle</a:t>
+            </a:r>
+          </a:p>
+          <a:p>
+            <a:pPr marL="0" indent="0">
+              <a:buNone/>
+            </a:pPr>
+            <a:r>
+              <a:rPr lang="en-AU" altLang="en-US" sz="2200" dirty="0"/>
+              <a:t>	“Depend upon abstractions, not concretions.”</a:t>
+            </a:r>
           </a:p>
         </p:txBody>
       </p:sp>
@@ -13078,7 +14069,7 @@
     </p:custDataLst>
     <p:extLst>
       <p:ext uri="{BB962C8B-B14F-4D97-AF65-F5344CB8AC3E}">
-        <p14:creationId xmlns:p14="http://schemas.microsoft.com/office/powerpoint/2010/main" val="250492798"/>
+        <p14:creationId xmlns:p14="http://schemas.microsoft.com/office/powerpoint/2010/main" val="2133247701"/>
       </p:ext>
     </p:extLst>
   </p:cSld>
@@ -13122,7 +14113,7 @@
           <a:p>
             <a:r>
               <a:rPr lang="en-US" altLang="en-US" dirty="0"/>
-              <a:t>Designing a Level Editor</a:t>
+              <a:t>Team vs Team</a:t>
             </a:r>
             <a:endParaRPr lang="en-AU" altLang="en-US" dirty="0"/>
           </a:p>
@@ -13153,13 +14144,49 @@
           </a:p>
         </p:txBody>
       </p:sp>
+      <p:pic>
+        <p:nvPicPr>
+          <p:cNvPr id="3" name="Picture 2" descr="Graphical user interface, map&#10;&#10;Description automatically generated with medium confidence">
+            <a:extLst>
+              <a:ext uri="{FF2B5EF4-FFF2-40B4-BE49-F238E27FC236}">
+                <a16:creationId xmlns:a16="http://schemas.microsoft.com/office/drawing/2014/main" id="{F982D5C6-EAA0-4E75-9839-D3F71065A9EF}"/>
+              </a:ext>
+            </a:extLst>
+          </p:cNvPr>
+          <p:cNvPicPr>
+            <a:picLocks noChangeAspect="1"/>
+          </p:cNvPicPr>
+          <p:nvPr/>
+        </p:nvPicPr>
+        <p:blipFill>
+          <a:blip r:embed="rId3">
+            <a:extLst>
+              <a:ext uri="{28A0092B-C50C-407E-A947-70E740481C1C}">
+                <a14:useLocalDpi xmlns:a14="http://schemas.microsoft.com/office/drawing/2010/main" val="0"/>
+              </a:ext>
+            </a:extLst>
+          </a:blip>
+          <a:stretch>
+            <a:fillRect/>
+          </a:stretch>
+        </p:blipFill>
+        <p:spPr>
+          <a:xfrm>
+            <a:off x="2362200" y="980730"/>
+            <a:ext cx="7162800" cy="4476750"/>
+          </a:xfrm>
+          <a:prstGeom prst="rect">
+            <a:avLst/>
+          </a:prstGeom>
+        </p:spPr>
+      </p:pic>
     </p:spTree>
     <p:custDataLst>
       <p:tags r:id="rId1"/>
     </p:custDataLst>
     <p:extLst>
       <p:ext uri="{BB962C8B-B14F-4D97-AF65-F5344CB8AC3E}">
-        <p14:creationId xmlns:p14="http://schemas.microsoft.com/office/powerpoint/2010/main" val="1538088131"/>
+        <p14:creationId xmlns:p14="http://schemas.microsoft.com/office/powerpoint/2010/main" val="250492798"/>
       </p:ext>
     </p:extLst>
   </p:cSld>
@@ -13203,7 +14230,7 @@
           <a:p>
             <a:r>
               <a:rPr lang="en-US" altLang="en-US" dirty="0"/>
-              <a:t>Any Questions?</a:t>
+              <a:t>Designing a Level Editor</a:t>
             </a:r>
             <a:endParaRPr lang="en-AU" altLang="en-US" dirty="0"/>
           </a:p>
@@ -13226,35 +14253,8 @@
           <a:p>
             <a:r>
               <a:rPr lang="en-AU" altLang="en-US" dirty="0"/>
-              <a:t>Further reading with references to a lot of content I talked about can be found in the PDF version to go with this talk.</a:t>
-            </a:r>
-          </a:p>
-          <a:p>
-            <a:r>
-              <a:rPr lang="en-AU" altLang="en-US" dirty="0"/>
-              <a:t>Welcome to send me a message or ask during the Wednesday session if you have any questions about the content. Time permitting, I may give suggestions or suggest sources to look at.</a:t>
-            </a:r>
-          </a:p>
-          <a:p>
-            <a:endParaRPr lang="en-AU" altLang="en-US" dirty="0"/>
-          </a:p>
-          <a:p>
-            <a:endParaRPr lang="en-AU" altLang="en-US" dirty="0"/>
-          </a:p>
-          <a:p>
-            <a:pPr marL="0" indent="0">
-              <a:buNone/>
-            </a:pPr>
-            <a:endParaRPr lang="en-AU" altLang="en-US" dirty="0"/>
-          </a:p>
-          <a:p>
-            <a:pPr marL="0" indent="0">
-              <a:buNone/>
-            </a:pPr>
-            <a:endParaRPr lang="en-AU" altLang="en-US" dirty="0"/>
-          </a:p>
-          <a:p>
-            <a:endParaRPr lang="en-AU" altLang="en-US" dirty="0"/>
+              <a:t>If there is time I will discuss how the level editor integrates into Chad’s Challenge.</a:t>
+            </a:r>
           </a:p>
         </p:txBody>
       </p:sp>
@@ -13264,7 +14264,7 @@
     </p:custDataLst>
     <p:extLst>
       <p:ext uri="{BB962C8B-B14F-4D97-AF65-F5344CB8AC3E}">
-        <p14:creationId xmlns:p14="http://schemas.microsoft.com/office/powerpoint/2010/main" val="3739730983"/>
+        <p14:creationId xmlns:p14="http://schemas.microsoft.com/office/powerpoint/2010/main" val="1538088131"/>
       </p:ext>
     </p:extLst>
   </p:cSld>

</xml_diff>